<commit_message>
Added 4Dev Katowice presentations
</commit_message>
<xml_diff>
--- a/4DevKatowice2018/USQL/BringYourNetCodeIntoBigData.pptx
+++ b/4DevKatowice2018/USQL/BringYourNetCodeIntoBigData.pptx
@@ -230,7 +230,7 @@
           <a:p>
             <a:fld id="{1E050263-9721-43EF-AC38-28F6115BDD45}" type="datetimeFigureOut">
               <a:rPr lang="en-US" smtClean="0"/>
-              <a:t>11/2/2018</a:t>
+              <a:t>11/6/2018</a:t>
             </a:fld>
             <a:endParaRPr lang="en-US"/>
           </a:p>
@@ -395,7 +395,7 @@
           <a:p>
             <a:fld id="{02790F4D-45E3-4E16-A568-54C3CC6D5229}" type="datetimeFigureOut">
               <a:rPr lang="en-US" smtClean="0"/>
-              <a:t>11/2/2018</a:t>
+              <a:t>11/6/2018</a:t>
             </a:fld>
             <a:endParaRPr lang="en-US"/>
           </a:p>
@@ -660,6 +660,4120 @@
     </a:lvl9pPr>
   </p:notesStyle>
 </p:notesMaster>
+</file>
+
+<file path=ppt/notesSlides/notesSlide1.xml><?xml version="1.0" encoding="utf-8"?>
+<p:notes xmlns:a="http://schemas.openxmlformats.org/drawingml/2006/main" xmlns:r="http://schemas.openxmlformats.org/officeDocument/2006/relationships" xmlns:p="http://schemas.openxmlformats.org/presentationml/2006/main">
+  <p:cSld>
+    <p:spTree>
+      <p:nvGrpSpPr>
+        <p:cNvPr id="1" name=""/>
+        <p:cNvGrpSpPr/>
+        <p:nvPr/>
+      </p:nvGrpSpPr>
+      <p:grpSpPr>
+        <a:xfrm>
+          <a:off x="0" y="0"/>
+          <a:ext cx="0" cy="0"/>
+          <a:chOff x="0" y="0"/>
+          <a:chExt cx="0" cy="0"/>
+        </a:xfrm>
+      </p:grpSpPr>
+      <p:sp>
+        <p:nvSpPr>
+          <p:cNvPr id="2" name="Slide Image Placeholder 1"/>
+          <p:cNvSpPr>
+            <a:spLocks noGrp="1" noRot="1" noChangeAspect="1"/>
+          </p:cNvSpPr>
+          <p:nvPr>
+            <p:ph type="sldImg"/>
+          </p:nvPr>
+        </p:nvSpPr>
+        <p:spPr/>
+      </p:sp>
+      <p:sp>
+        <p:nvSpPr>
+          <p:cNvPr id="3" name="Notes Placeholder 2"/>
+          <p:cNvSpPr>
+            <a:spLocks noGrp="1"/>
+          </p:cNvSpPr>
+          <p:nvPr>
+            <p:ph type="body" idx="1"/>
+          </p:nvPr>
+        </p:nvSpPr>
+        <p:spPr/>
+        <p:txBody>
+          <a:bodyPr/>
+          <a:lstStyle/>
+          <a:p>
+            <a:r>
+              <a:rPr lang="en-GB" dirty="0" err="1"/>
+              <a:t>Nazywam</a:t>
+            </a:r>
+            <a:r>
+              <a:rPr lang="en-GB" dirty="0"/>
+              <a:t> </a:t>
+            </a:r>
+            <a:r>
+              <a:rPr lang="en-GB" dirty="0" err="1"/>
+              <a:t>sie</a:t>
+            </a:r>
+            <a:r>
+              <a:rPr lang="en-GB" dirty="0"/>
+              <a:t> TK –</a:t>
+            </a:r>
+            <a:r>
+              <a:rPr lang="en-GB" dirty="0" err="1"/>
+              <a:t>aktualnie</a:t>
+            </a:r>
+            <a:r>
+              <a:rPr lang="en-GB" dirty="0"/>
+              <a:t> </a:t>
+            </a:r>
+            <a:r>
+              <a:rPr lang="en-GB" dirty="0" err="1"/>
+              <a:t>wsplpracuje</a:t>
+            </a:r>
+            <a:r>
+              <a:rPr lang="en-GB" dirty="0"/>
+              <a:t> z </a:t>
+            </a:r>
+            <a:r>
+              <a:rPr lang="en-GB" dirty="0" err="1"/>
+              <a:t>firma</a:t>
+            </a:r>
+            <a:r>
+              <a:rPr lang="en-GB" dirty="0"/>
+              <a:t> FP w </a:t>
+            </a:r>
+            <a:r>
+              <a:rPr lang="en-GB" dirty="0" err="1"/>
+              <a:t>takiej</a:t>
+            </a:r>
+            <a:r>
+              <a:rPr lang="en-GB" dirty="0"/>
+              <a:t> </a:t>
+            </a:r>
+            <a:r>
+              <a:rPr lang="en-GB" dirty="0" err="1"/>
+              <a:t>komorce</a:t>
+            </a:r>
+            <a:r>
+              <a:rPr lang="en-GB" dirty="0"/>
+              <a:t> </a:t>
+            </a:r>
+            <a:r>
+              <a:rPr lang="en-GB" dirty="0" err="1"/>
+              <a:t>ktora</a:t>
+            </a:r>
+            <a:r>
+              <a:rPr lang="en-GB" dirty="0"/>
+              <a:t> </a:t>
+            </a:r>
+            <a:r>
+              <a:rPr lang="en-GB" dirty="0" err="1"/>
+              <a:t>nazywa</a:t>
+            </a:r>
+            <a:r>
+              <a:rPr lang="en-GB" dirty="0"/>
+              <a:t> </a:t>
+            </a:r>
+            <a:r>
+              <a:rPr lang="en-GB" dirty="0" err="1"/>
+              <a:t>sie</a:t>
+            </a:r>
+            <a:r>
+              <a:rPr lang="en-GB" dirty="0"/>
+              <a:t> Data Solution</a:t>
+            </a:r>
+          </a:p>
+          <a:p>
+            <a:r>
+              <a:rPr lang="en-GB" dirty="0"/>
+              <a:t>– </a:t>
+            </a:r>
+            <a:r>
+              <a:rPr lang="en-GB" dirty="0" err="1"/>
+              <a:t>jak</a:t>
+            </a:r>
+            <a:r>
+              <a:rPr lang="en-GB" dirty="0"/>
+              <a:t> </a:t>
+            </a:r>
+            <a:r>
+              <a:rPr lang="en-GB" dirty="0" err="1"/>
+              <a:t>moje</a:t>
+            </a:r>
+            <a:r>
+              <a:rPr lang="en-GB" dirty="0"/>
+              <a:t> </a:t>
+            </a:r>
+            <a:r>
+              <a:rPr lang="en-GB" dirty="0" err="1"/>
+              <a:t>córki</a:t>
+            </a:r>
+            <a:r>
+              <a:rPr lang="en-GB" dirty="0"/>
+              <a:t> </a:t>
+            </a:r>
+            <a:r>
+              <a:rPr lang="en-GB" dirty="0" err="1"/>
+              <a:t>pyta</a:t>
+            </a:r>
+            <a:r>
+              <a:rPr lang="en-GB" dirty="0"/>
+              <a:t> co </a:t>
+            </a:r>
+            <a:r>
+              <a:rPr lang="en-GB" dirty="0" err="1"/>
+              <a:t>robie</a:t>
+            </a:r>
+            <a:r>
+              <a:rPr lang="en-GB" dirty="0"/>
+              <a:t> to </a:t>
+            </a:r>
+            <a:r>
+              <a:rPr lang="en-GB" dirty="0" err="1"/>
+              <a:t>mowie</a:t>
+            </a:r>
+            <a:r>
+              <a:rPr lang="en-GB" dirty="0"/>
+              <a:t> ze </a:t>
+            </a:r>
+            <a:r>
+              <a:rPr lang="en-GB" dirty="0" err="1"/>
+              <a:t>bawie</a:t>
+            </a:r>
+            <a:r>
+              <a:rPr lang="en-GB" dirty="0"/>
+              <a:t> </a:t>
+            </a:r>
+            <a:r>
+              <a:rPr lang="en-GB" dirty="0" err="1"/>
+              <a:t>sie</a:t>
+            </a:r>
+            <a:r>
+              <a:rPr lang="en-GB" dirty="0"/>
+              <a:t> </a:t>
+            </a:r>
+            <a:r>
+              <a:rPr lang="en-GB" dirty="0" err="1"/>
+              <a:t>chmura</a:t>
+            </a:r>
+            <a:r>
+              <a:rPr lang="en-GB" dirty="0"/>
+              <a:t> a </a:t>
+            </a:r>
+            <a:r>
+              <a:rPr lang="en-GB" dirty="0" err="1"/>
+              <a:t>dokladaniej</a:t>
+            </a:r>
+            <a:r>
+              <a:rPr lang="en-GB" dirty="0"/>
+              <a:t> </a:t>
+            </a:r>
+            <a:r>
+              <a:rPr lang="en-GB" dirty="0" err="1"/>
+              <a:t>zajmuje</a:t>
+            </a:r>
+            <a:r>
+              <a:rPr lang="en-GB" dirty="0"/>
+              <a:t> </a:t>
+            </a:r>
+            <a:r>
+              <a:rPr lang="en-GB" dirty="0" err="1"/>
+              <a:t>sie</a:t>
+            </a:r>
+            <a:r>
+              <a:rPr lang="en-GB" dirty="0"/>
+              <a:t> </a:t>
+            </a:r>
+            <a:r>
+              <a:rPr lang="en-GB" dirty="0" err="1"/>
+              <a:t>przetwarzaniem</a:t>
+            </a:r>
+            <a:r>
+              <a:rPr lang="en-GB" dirty="0"/>
+              <a:t> </a:t>
+            </a:r>
+            <a:r>
+              <a:rPr lang="en-GB" dirty="0" err="1"/>
+              <a:t>duzych</a:t>
+            </a:r>
+            <a:r>
+              <a:rPr lang="en-GB" dirty="0"/>
+              <a:t> </a:t>
+            </a:r>
+            <a:r>
+              <a:rPr lang="en-GB" dirty="0" err="1"/>
+              <a:t>zbiorow</a:t>
+            </a:r>
+            <a:r>
+              <a:rPr lang="en-GB" dirty="0"/>
+              <a:t> </a:t>
+            </a:r>
+            <a:r>
+              <a:rPr lang="en-GB" dirty="0" err="1"/>
+              <a:t>danych</a:t>
+            </a:r>
+            <a:r>
+              <a:rPr lang="en-GB" dirty="0"/>
+              <a:t> w </a:t>
+            </a:r>
+            <a:r>
+              <a:rPr lang="en-GB" dirty="0" err="1"/>
+              <a:t>chmurze</a:t>
+            </a:r>
+            <a:r>
+              <a:rPr lang="en-GB" dirty="0"/>
+              <a:t> Azure</a:t>
+            </a:r>
+          </a:p>
+          <a:p>
+            <a:r>
+              <a:rPr lang="en-GB" dirty="0" err="1"/>
+              <a:t>Dzis</a:t>
+            </a:r>
+            <a:r>
+              <a:rPr lang="en-GB" dirty="0"/>
+              <a:t> </a:t>
+            </a:r>
+            <a:r>
+              <a:rPr lang="en-GB" dirty="0" err="1"/>
+              <a:t>chcialbym</a:t>
+            </a:r>
+            <a:r>
+              <a:rPr lang="en-GB" dirty="0"/>
+              <a:t> </a:t>
+            </a:r>
+            <a:r>
+              <a:rPr lang="en-GB" dirty="0" err="1"/>
+              <a:t>Wam</a:t>
+            </a:r>
+            <a:r>
+              <a:rPr lang="en-GB" dirty="0"/>
+              <a:t> </a:t>
+            </a:r>
+            <a:r>
+              <a:rPr lang="en-GB" dirty="0" err="1"/>
+              <a:t>odpowiedziec</a:t>
+            </a:r>
+            <a:r>
+              <a:rPr lang="en-GB" dirty="0"/>
+              <a:t> o </a:t>
+            </a:r>
+            <a:r>
+              <a:rPr lang="en-GB" dirty="0" err="1"/>
+              <a:t>jdenych</a:t>
+            </a:r>
+            <a:r>
+              <a:rPr lang="en-GB" dirty="0"/>
+              <a:t> z </a:t>
+            </a:r>
+            <a:r>
+              <a:rPr lang="en-GB" dirty="0" err="1"/>
+              <a:t>moim</a:t>
+            </a:r>
+            <a:r>
+              <a:rPr lang="en-GB" dirty="0"/>
+              <a:t> </a:t>
+            </a:r>
+            <a:r>
+              <a:rPr lang="en-GB" dirty="0" err="1"/>
+              <a:t>zabawek</a:t>
+            </a:r>
+            <a:r>
+              <a:rPr lang="en-GB" dirty="0"/>
+              <a:t> – </a:t>
+            </a:r>
+            <a:r>
+              <a:rPr lang="en-GB" dirty="0" err="1"/>
+              <a:t>generlanie</a:t>
+            </a:r>
+            <a:r>
+              <a:rPr lang="en-GB" dirty="0"/>
+              <a:t> to </a:t>
+            </a:r>
+            <a:r>
+              <a:rPr lang="en-GB" dirty="0" err="1"/>
+              <a:t>chcialbym</a:t>
+            </a:r>
+            <a:r>
+              <a:rPr lang="en-GB" dirty="0"/>
+              <a:t> </a:t>
+            </a:r>
+            <a:r>
+              <a:rPr lang="en-GB" dirty="0" err="1"/>
+              <a:t>odpowiedziec</a:t>
+            </a:r>
+            <a:r>
+              <a:rPr lang="en-GB" dirty="0"/>
+              <a:t> </a:t>
+            </a:r>
+            <a:r>
+              <a:rPr lang="en-GB" dirty="0" err="1"/>
+              <a:t>jak</a:t>
+            </a:r>
+            <a:r>
+              <a:rPr lang="en-GB" dirty="0"/>
+              <a:t> </a:t>
+            </a:r>
+            <a:r>
+              <a:rPr lang="en-GB" dirty="0" err="1"/>
+              <a:t>ja</a:t>
+            </a:r>
+            <a:r>
+              <a:rPr lang="en-GB" dirty="0"/>
+              <a:t> </a:t>
+            </a:r>
+            <a:r>
+              <a:rPr lang="en-GB" dirty="0" err="1"/>
+              <a:t>zaczynalem</a:t>
+            </a:r>
+            <a:r>
+              <a:rPr lang="en-GB" dirty="0"/>
+              <a:t> </a:t>
+            </a:r>
+            <a:r>
+              <a:rPr lang="en-GB" dirty="0" err="1"/>
+              <a:t>swoja</a:t>
+            </a:r>
+            <a:r>
+              <a:rPr lang="en-GB" dirty="0"/>
+              <a:t> </a:t>
+            </a:r>
+            <a:r>
+              <a:rPr lang="en-GB" dirty="0" err="1"/>
+              <a:t>przygotoge</a:t>
+            </a:r>
+            <a:r>
+              <a:rPr lang="en-GB" dirty="0"/>
+              <a:t> z Big Data,</a:t>
+            </a:r>
+          </a:p>
+          <a:p>
+            <a:pPr marL="0" marR="0" lvl="0" indent="0" algn="l" defTabSz="914400" rtl="0" eaLnBrk="1" fontAlgn="auto" latinLnBrk="0" hangingPunct="1">
+              <a:lnSpc>
+                <a:spcPct val="100000"/>
+              </a:lnSpc>
+              <a:spcBef>
+                <a:spcPts val="0"/>
+              </a:spcBef>
+              <a:spcAft>
+                <a:spcPts val="0"/>
+              </a:spcAft>
+              <a:buClrTx/>
+              <a:buSzTx/>
+              <a:buFontTx/>
+              <a:buNone/>
+              <a:tabLst/>
+              <a:defRPr/>
+            </a:pPr>
+            <a:r>
+              <a:rPr lang="en-GB" dirty="0" err="1"/>
+              <a:t>Czy</a:t>
+            </a:r>
+            <a:r>
+              <a:rPr lang="en-GB" dirty="0"/>
+              <a:t> </a:t>
+            </a:r>
+            <a:r>
+              <a:rPr lang="en-GB" dirty="0" err="1"/>
+              <a:t>ktos</a:t>
+            </a:r>
+            <a:r>
+              <a:rPr lang="en-GB" dirty="0"/>
+              <a:t> </a:t>
+            </a:r>
+            <a:r>
+              <a:rPr lang="en-GB" dirty="0" err="1"/>
+              <a:t>sie</a:t>
+            </a:r>
+            <a:r>
+              <a:rPr lang="en-GB" dirty="0"/>
+              <a:t> </a:t>
+            </a:r>
+            <a:r>
+              <a:rPr lang="en-GB" dirty="0" err="1"/>
+              <a:t>znajmuje</a:t>
+            </a:r>
+            <a:r>
+              <a:rPr lang="en-GB" dirty="0"/>
+              <a:t> BIG DATA?</a:t>
+            </a:r>
+          </a:p>
+          <a:p>
+            <a:pPr marL="0" marR="0" lvl="0" indent="0" algn="l" defTabSz="914400" rtl="0" eaLnBrk="1" fontAlgn="auto" latinLnBrk="0" hangingPunct="1">
+              <a:lnSpc>
+                <a:spcPct val="100000"/>
+              </a:lnSpc>
+              <a:spcBef>
+                <a:spcPts val="0"/>
+              </a:spcBef>
+              <a:spcAft>
+                <a:spcPts val="0"/>
+              </a:spcAft>
+              <a:buClrTx/>
+              <a:buSzTx/>
+              <a:buFontTx/>
+              <a:buNone/>
+              <a:tabLst/>
+              <a:defRPr/>
+            </a:pPr>
+            <a:r>
+              <a:rPr lang="en-GB" dirty="0"/>
+              <a:t>A </a:t>
+            </a:r>
+            <a:r>
+              <a:rPr lang="en-GB" dirty="0" err="1"/>
+              <a:t>czy</a:t>
+            </a:r>
+            <a:r>
+              <a:rPr lang="en-GB" dirty="0"/>
+              <a:t> </a:t>
+            </a:r>
+            <a:r>
+              <a:rPr lang="en-GB" dirty="0" err="1"/>
+              <a:t>ktos</a:t>
+            </a:r>
+            <a:r>
+              <a:rPr lang="en-GB" dirty="0"/>
+              <a:t> by </a:t>
+            </a:r>
+            <a:r>
+              <a:rPr lang="en-GB" dirty="0" err="1"/>
+              <a:t>chcial</a:t>
+            </a:r>
+            <a:r>
+              <a:rPr lang="en-GB" dirty="0"/>
+              <a:t>?</a:t>
+            </a:r>
+          </a:p>
+          <a:p>
+            <a:pPr marL="0" marR="0" lvl="0" indent="0" algn="l" defTabSz="914400" rtl="0" eaLnBrk="1" fontAlgn="auto" latinLnBrk="0" hangingPunct="1">
+              <a:lnSpc>
+                <a:spcPct val="100000"/>
+              </a:lnSpc>
+              <a:spcBef>
+                <a:spcPts val="0"/>
+              </a:spcBef>
+              <a:spcAft>
+                <a:spcPts val="0"/>
+              </a:spcAft>
+              <a:buClrTx/>
+              <a:buSzTx/>
+              <a:buFontTx/>
+              <a:buNone/>
+              <a:tabLst/>
+              <a:defRPr/>
+            </a:pPr>
+            <a:r>
+              <a:rPr lang="en-GB" dirty="0"/>
+              <a:t>A </a:t>
+            </a:r>
+            <a:r>
+              <a:rPr lang="en-GB" dirty="0" err="1"/>
+              <a:t>kto</a:t>
+            </a:r>
+            <a:r>
+              <a:rPr lang="en-GB" dirty="0"/>
+              <a:t> </a:t>
+            </a:r>
+            <a:r>
+              <a:rPr lang="en-GB" dirty="0" err="1"/>
+              <a:t>zna</a:t>
+            </a:r>
+            <a:r>
+              <a:rPr lang="en-GB" dirty="0"/>
+              <a:t> .NET I SQL – to po </a:t>
+            </a:r>
+            <a:r>
+              <a:rPr lang="en-GB" dirty="0" err="1"/>
+              <a:t>tej</a:t>
+            </a:r>
+            <a:r>
+              <a:rPr lang="en-GB" dirty="0"/>
+              <a:t> </a:t>
+            </a:r>
+            <a:r>
+              <a:rPr lang="en-GB" dirty="0" err="1"/>
+              <a:t>sesji</a:t>
+            </a:r>
+            <a:r>
+              <a:rPr lang="en-GB" dirty="0"/>
+              <a:t> </a:t>
+            </a:r>
+            <a:r>
+              <a:rPr lang="en-GB" dirty="0" err="1"/>
+              <a:t>bedziecie</a:t>
+            </a:r>
+            <a:r>
+              <a:rPr lang="en-GB" dirty="0"/>
+              <a:t> </a:t>
+            </a:r>
+            <a:r>
+              <a:rPr lang="en-GB" dirty="0" err="1"/>
+              <a:t>mogi</a:t>
+            </a:r>
+            <a:r>
+              <a:rPr lang="en-GB" dirty="0"/>
+              <a:t> </a:t>
+            </a:r>
+            <a:r>
+              <a:rPr lang="en-GB" dirty="0" err="1"/>
+              <a:t>przetwarzac</a:t>
+            </a:r>
+            <a:r>
+              <a:rPr lang="en-GB" dirty="0"/>
+              <a:t> Terabyte </a:t>
+            </a:r>
+            <a:r>
+              <a:rPr lang="en-GB" dirty="0" err="1"/>
+              <a:t>danych</a:t>
+            </a:r>
+            <a:endParaRPr lang="pl-PL" dirty="0"/>
+          </a:p>
+          <a:p>
+            <a:endParaRPr lang="en-GB" dirty="0"/>
+          </a:p>
+        </p:txBody>
+      </p:sp>
+      <p:sp>
+        <p:nvSpPr>
+          <p:cNvPr id="4" name="Slide Number Placeholder 3"/>
+          <p:cNvSpPr>
+            <a:spLocks noGrp="1"/>
+          </p:cNvSpPr>
+          <p:nvPr>
+            <p:ph type="sldNum" sz="quarter" idx="5"/>
+          </p:nvPr>
+        </p:nvSpPr>
+        <p:spPr/>
+        <p:txBody>
+          <a:bodyPr/>
+          <a:lstStyle/>
+          <a:p>
+            <a:fld id="{55992286-4AA4-4E55-98B6-FFAF34B74A40}" type="slidenum">
+              <a:rPr lang="en-US" smtClean="0"/>
+              <a:t>1</a:t>
+            </a:fld>
+            <a:endParaRPr lang="en-US"/>
+          </a:p>
+        </p:txBody>
+      </p:sp>
+    </p:spTree>
+    <p:extLst>
+      <p:ext uri="{BB962C8B-B14F-4D97-AF65-F5344CB8AC3E}">
+        <p14:creationId xmlns:p14="http://schemas.microsoft.com/office/powerpoint/2010/main" val="3885665939"/>
+      </p:ext>
+    </p:extLst>
+  </p:cSld>
+  <p:clrMapOvr>
+    <a:masterClrMapping/>
+  </p:clrMapOvr>
+</p:notes>
+</file>
+
+<file path=ppt/notesSlides/notesSlide10.xml><?xml version="1.0" encoding="utf-8"?>
+<p:notes xmlns:a="http://schemas.openxmlformats.org/drawingml/2006/main" xmlns:r="http://schemas.openxmlformats.org/officeDocument/2006/relationships" xmlns:p="http://schemas.openxmlformats.org/presentationml/2006/main">
+  <p:cSld>
+    <p:spTree>
+      <p:nvGrpSpPr>
+        <p:cNvPr id="1" name=""/>
+        <p:cNvGrpSpPr/>
+        <p:nvPr/>
+      </p:nvGrpSpPr>
+      <p:grpSpPr>
+        <a:xfrm>
+          <a:off x="0" y="0"/>
+          <a:ext cx="0" cy="0"/>
+          <a:chOff x="0" y="0"/>
+          <a:chExt cx="0" cy="0"/>
+        </a:xfrm>
+      </p:grpSpPr>
+      <p:sp>
+        <p:nvSpPr>
+          <p:cNvPr id="2" name="Slide Image Placeholder 1"/>
+          <p:cNvSpPr>
+            <a:spLocks noGrp="1" noRot="1" noChangeAspect="1"/>
+          </p:cNvSpPr>
+          <p:nvPr>
+            <p:ph type="sldImg"/>
+          </p:nvPr>
+        </p:nvSpPr>
+        <p:spPr/>
+      </p:sp>
+      <p:sp>
+        <p:nvSpPr>
+          <p:cNvPr id="3" name="Notes Placeholder 2"/>
+          <p:cNvSpPr>
+            <a:spLocks noGrp="1"/>
+          </p:cNvSpPr>
+          <p:nvPr>
+            <p:ph type="body" idx="1"/>
+          </p:nvPr>
+        </p:nvSpPr>
+        <p:spPr/>
+        <p:txBody>
+          <a:bodyPr/>
+          <a:lstStyle/>
+          <a:p>
+            <a:r>
+              <a:rPr lang="en-GB" dirty="0"/>
+              <a:t>Microsoft </a:t>
+            </a:r>
+            <a:r>
+              <a:rPr lang="en-GB" dirty="0" err="1"/>
+              <a:t>uznal</a:t>
+            </a:r>
+            <a:r>
+              <a:rPr lang="en-GB" dirty="0"/>
+              <a:t> ze </a:t>
+            </a:r>
+            <a:r>
+              <a:rPr lang="en-GB" dirty="0" err="1"/>
+              <a:t>skoro</a:t>
+            </a:r>
+            <a:r>
+              <a:rPr lang="en-GB" dirty="0"/>
+              <a:t> C# jest </a:t>
+            </a:r>
+            <a:r>
+              <a:rPr lang="en-GB" dirty="0" err="1"/>
+              <a:t>taki</a:t>
+            </a:r>
+            <a:r>
+              <a:rPr lang="en-GB" dirty="0"/>
+              <a:t> </a:t>
+            </a:r>
+            <a:r>
+              <a:rPr lang="en-GB" dirty="0" err="1"/>
+              <a:t>popularny</a:t>
+            </a:r>
+            <a:r>
+              <a:rPr lang="en-GB" dirty="0"/>
+              <a:t> to </a:t>
+            </a:r>
+            <a:r>
+              <a:rPr lang="en-GB" dirty="0" err="1"/>
+              <a:t>wezmy</a:t>
+            </a:r>
+            <a:r>
+              <a:rPr lang="en-GB" dirty="0"/>
+              <a:t> to co </a:t>
+            </a:r>
+            <a:r>
+              <a:rPr lang="en-GB" dirty="0" err="1"/>
+              <a:t>nalepsze</a:t>
+            </a:r>
+            <a:r>
+              <a:rPr lang="en-GB" dirty="0"/>
+              <a:t> z C# + SQL I </a:t>
+            </a:r>
+            <a:r>
+              <a:rPr lang="en-GB" dirty="0" err="1"/>
+              <a:t>tak</a:t>
+            </a:r>
+            <a:r>
+              <a:rPr lang="en-GB" dirty="0"/>
+              <a:t> </a:t>
+            </a:r>
+            <a:r>
+              <a:rPr lang="en-GB" dirty="0" err="1"/>
+              <a:t>powslal</a:t>
+            </a:r>
+            <a:r>
+              <a:rPr lang="en-GB" dirty="0"/>
+              <a:t> U-SQL </a:t>
+            </a:r>
+            <a:r>
+              <a:rPr lang="en-GB" dirty="0" err="1"/>
+              <a:t>skad</a:t>
+            </a:r>
+            <a:r>
+              <a:rPr lang="en-GB" dirty="0"/>
+              <a:t> </a:t>
+            </a:r>
+            <a:r>
+              <a:rPr lang="en-GB" dirty="0" err="1"/>
+              <a:t>nazwa</a:t>
+            </a:r>
+            <a:r>
+              <a:rPr lang="en-GB" dirty="0"/>
+              <a:t> po T-SQL od U-od </a:t>
+            </a:r>
+            <a:r>
+              <a:rPr lang="en-GB" dirty="0" err="1"/>
+              <a:t>ubootow</a:t>
+            </a:r>
+            <a:r>
+              <a:rPr lang="en-GB" dirty="0"/>
+              <a:t> (</a:t>
+            </a:r>
+            <a:r>
+              <a:rPr lang="en-GB" dirty="0" err="1"/>
+              <a:t>lodzi</a:t>
+            </a:r>
+            <a:r>
+              <a:rPr lang="en-GB" dirty="0"/>
+              <a:t> </a:t>
+            </a:r>
+            <a:r>
+              <a:rPr lang="en-GB" dirty="0" err="1"/>
+              <a:t>podwodnych</a:t>
+            </a:r>
+            <a:r>
+              <a:rPr lang="en-GB" dirty="0"/>
+              <a:t>) aby </a:t>
+            </a:r>
+            <a:r>
+              <a:rPr lang="en-GB" dirty="0" err="1"/>
+              <a:t>mozna</a:t>
+            </a:r>
+            <a:r>
+              <a:rPr lang="en-GB" dirty="0"/>
+              <a:t> </a:t>
+            </a:r>
+            <a:r>
+              <a:rPr lang="en-GB" dirty="0" err="1"/>
+              <a:t>bylo</a:t>
+            </a:r>
+            <a:r>
+              <a:rPr lang="en-GB" dirty="0"/>
+              <a:t> </a:t>
+            </a:r>
+            <a:r>
+              <a:rPr lang="en-GB" dirty="0" err="1"/>
+              <a:t>tak</a:t>
+            </a:r>
+            <a:r>
+              <a:rPr lang="en-GB" dirty="0"/>
+              <a:t> </a:t>
+            </a:r>
+            <a:r>
+              <a:rPr lang="en-GB" dirty="0" err="1"/>
+              <a:t>jak</a:t>
+            </a:r>
+            <a:r>
+              <a:rPr lang="en-GB" dirty="0"/>
+              <a:t> </a:t>
+            </a:r>
+            <a:r>
+              <a:rPr lang="en-GB" dirty="0" err="1"/>
+              <a:t>uboty</a:t>
+            </a:r>
+            <a:r>
+              <a:rPr lang="en-GB" dirty="0"/>
+              <a:t> </a:t>
+            </a:r>
+            <a:r>
+              <a:rPr lang="en-GB" dirty="0" err="1"/>
+              <a:t>geleboko</a:t>
+            </a:r>
+            <a:r>
+              <a:rPr lang="en-GB" dirty="0"/>
+              <a:t> I </a:t>
+            </a:r>
+            <a:r>
+              <a:rPr lang="en-GB" dirty="0" err="1"/>
+              <a:t>dokladanie</a:t>
+            </a:r>
+            <a:r>
+              <a:rPr lang="en-GB" dirty="0"/>
+              <a:t> </a:t>
+            </a:r>
+            <a:r>
+              <a:rPr lang="en-GB" dirty="0" err="1"/>
+              <a:t>analyzowac</a:t>
+            </a:r>
+            <a:r>
+              <a:rPr lang="en-GB" dirty="0"/>
+              <a:t> </a:t>
+            </a:r>
+            <a:r>
+              <a:rPr lang="en-GB" dirty="0" err="1"/>
+              <a:t>dane</a:t>
+            </a:r>
+            <a:r>
+              <a:rPr lang="en-GB" dirty="0"/>
+              <a:t> z </a:t>
+            </a:r>
+            <a:r>
+              <a:rPr lang="en-GB" dirty="0" err="1"/>
+              <a:t>jeziora</a:t>
+            </a:r>
+            <a:r>
+              <a:rPr lang="en-GB" dirty="0"/>
+              <a:t> </a:t>
+            </a:r>
+            <a:r>
+              <a:rPr lang="en-GB" dirty="0" err="1"/>
+              <a:t>danych</a:t>
+            </a:r>
+            <a:endParaRPr lang="en-GB" dirty="0"/>
+          </a:p>
+          <a:p>
+            <a:r>
+              <a:rPr lang="en-GB" dirty="0" err="1"/>
+              <a:t>Nowy</a:t>
+            </a:r>
+            <a:r>
+              <a:rPr lang="en-GB" dirty="0"/>
+              <a:t> </a:t>
+            </a:r>
+            <a:r>
+              <a:rPr lang="en-GB" dirty="0" err="1"/>
+              <a:t>jezyk</a:t>
+            </a:r>
+            <a:r>
+              <a:rPr lang="en-GB" dirty="0"/>
+              <a:t> ale </a:t>
+            </a:r>
+            <a:r>
+              <a:rPr lang="en-GB" dirty="0" err="1"/>
+              <a:t>czy</a:t>
+            </a:r>
+            <a:r>
+              <a:rPr lang="en-GB" dirty="0"/>
+              <a:t> </a:t>
+            </a:r>
+            <a:r>
+              <a:rPr lang="en-GB" dirty="0" err="1"/>
+              <a:t>taki</a:t>
+            </a:r>
+            <a:r>
+              <a:rPr lang="en-GB" dirty="0"/>
+              <a:t> </a:t>
+            </a:r>
+            <a:r>
+              <a:rPr lang="en-GB" dirty="0" err="1"/>
+              <a:t>nowy</a:t>
+            </a:r>
+            <a:endParaRPr lang="pl-PL" dirty="0"/>
+          </a:p>
+        </p:txBody>
+      </p:sp>
+      <p:sp>
+        <p:nvSpPr>
+          <p:cNvPr id="4" name="Slide Number Placeholder 3"/>
+          <p:cNvSpPr>
+            <a:spLocks noGrp="1"/>
+          </p:cNvSpPr>
+          <p:nvPr>
+            <p:ph type="sldNum" sz="quarter" idx="5"/>
+          </p:nvPr>
+        </p:nvSpPr>
+        <p:spPr/>
+        <p:txBody>
+          <a:bodyPr/>
+          <a:lstStyle/>
+          <a:p>
+            <a:fld id="{55992286-4AA4-4E55-98B6-FFAF34B74A40}" type="slidenum">
+              <a:rPr lang="en-US" smtClean="0"/>
+              <a:t>10</a:t>
+            </a:fld>
+            <a:endParaRPr lang="en-US"/>
+          </a:p>
+        </p:txBody>
+      </p:sp>
+    </p:spTree>
+    <p:extLst>
+      <p:ext uri="{BB962C8B-B14F-4D97-AF65-F5344CB8AC3E}">
+        <p14:creationId xmlns:p14="http://schemas.microsoft.com/office/powerpoint/2010/main" val="4049849541"/>
+      </p:ext>
+    </p:extLst>
+  </p:cSld>
+  <p:clrMapOvr>
+    <a:masterClrMapping/>
+  </p:clrMapOvr>
+</p:notes>
+</file>
+
+<file path=ppt/notesSlides/notesSlide11.xml><?xml version="1.0" encoding="utf-8"?>
+<p:notes xmlns:a="http://schemas.openxmlformats.org/drawingml/2006/main" xmlns:r="http://schemas.openxmlformats.org/officeDocument/2006/relationships" xmlns:p="http://schemas.openxmlformats.org/presentationml/2006/main">
+  <p:cSld>
+    <p:spTree>
+      <p:nvGrpSpPr>
+        <p:cNvPr id="1" name=""/>
+        <p:cNvGrpSpPr/>
+        <p:nvPr/>
+      </p:nvGrpSpPr>
+      <p:grpSpPr>
+        <a:xfrm>
+          <a:off x="0" y="0"/>
+          <a:ext cx="0" cy="0"/>
+          <a:chOff x="0" y="0"/>
+          <a:chExt cx="0" cy="0"/>
+        </a:xfrm>
+      </p:grpSpPr>
+      <p:sp>
+        <p:nvSpPr>
+          <p:cNvPr id="2" name="Slide Image Placeholder 1"/>
+          <p:cNvSpPr>
+            <a:spLocks noGrp="1" noRot="1" noChangeAspect="1"/>
+          </p:cNvSpPr>
+          <p:nvPr>
+            <p:ph type="sldImg"/>
+          </p:nvPr>
+        </p:nvSpPr>
+        <p:spPr/>
+      </p:sp>
+      <p:sp>
+        <p:nvSpPr>
+          <p:cNvPr id="3" name="Notes Placeholder 2"/>
+          <p:cNvSpPr>
+            <a:spLocks noGrp="1"/>
+          </p:cNvSpPr>
+          <p:nvPr>
+            <p:ph type="body" idx="1"/>
+          </p:nvPr>
+        </p:nvSpPr>
+        <p:spPr/>
+        <p:txBody>
+          <a:bodyPr/>
+          <a:lstStyle/>
+          <a:p>
+            <a:r>
+              <a:rPr lang="en-GB" dirty="0" err="1"/>
+              <a:t>Jak</a:t>
+            </a:r>
+            <a:r>
+              <a:rPr lang="en-GB" dirty="0"/>
+              <a:t> </a:t>
+            </a:r>
+            <a:r>
+              <a:rPr lang="en-GB" dirty="0" err="1"/>
+              <a:t>wyglada</a:t>
+            </a:r>
+            <a:r>
+              <a:rPr lang="en-GB" dirty="0"/>
+              <a:t> u-SQL</a:t>
+            </a:r>
+          </a:p>
+          <a:p>
+            <a:r>
+              <a:rPr lang="en-GB" dirty="0"/>
+              <a:t>Problem </a:t>
+            </a:r>
+          </a:p>
+          <a:p>
+            <a:r>
+              <a:rPr lang="en-GB" dirty="0" err="1"/>
+              <a:t>Jeden</a:t>
+            </a:r>
+            <a:r>
+              <a:rPr lang="en-GB" dirty="0"/>
+              <a:t> </a:t>
+            </a:r>
+            <a:r>
+              <a:rPr lang="en-GB" dirty="0" err="1"/>
+              <a:t>rowset</a:t>
+            </a:r>
+            <a:r>
+              <a:rPr lang="en-GB" dirty="0"/>
+              <a:t> </a:t>
+            </a:r>
+            <a:r>
+              <a:rPr lang="en-GB" dirty="0" err="1"/>
+              <a:t>mozemy</a:t>
+            </a:r>
+            <a:r>
+              <a:rPr lang="en-GB" dirty="0"/>
+              <a:t> </a:t>
+            </a:r>
+            <a:r>
+              <a:rPr lang="en-GB" dirty="0" err="1"/>
+              <a:t>byc</a:t>
+            </a:r>
+            <a:r>
+              <a:rPr lang="en-GB" dirty="0"/>
+              <a:t> </a:t>
+            </a:r>
+            <a:r>
+              <a:rPr lang="en-GB" dirty="0" err="1"/>
+              <a:t>zapisany</a:t>
+            </a:r>
+            <a:r>
+              <a:rPr lang="en-GB" dirty="0"/>
+              <a:t> do </a:t>
+            </a:r>
+            <a:r>
+              <a:rPr lang="en-GB" dirty="0" err="1"/>
+              <a:t>jednego</a:t>
+            </a:r>
+            <a:r>
+              <a:rPr lang="en-GB" dirty="0"/>
+              <a:t> </a:t>
+            </a:r>
+            <a:r>
+              <a:rPr lang="en-GB" dirty="0" err="1"/>
+              <a:t>pliku</a:t>
+            </a:r>
+            <a:endParaRPr lang="pl-PL" dirty="0"/>
+          </a:p>
+        </p:txBody>
+      </p:sp>
+      <p:sp>
+        <p:nvSpPr>
+          <p:cNvPr id="4" name="Slide Number Placeholder 3"/>
+          <p:cNvSpPr>
+            <a:spLocks noGrp="1"/>
+          </p:cNvSpPr>
+          <p:nvPr>
+            <p:ph type="sldNum" sz="quarter" idx="5"/>
+          </p:nvPr>
+        </p:nvSpPr>
+        <p:spPr/>
+        <p:txBody>
+          <a:bodyPr/>
+          <a:lstStyle/>
+          <a:p>
+            <a:fld id="{55992286-4AA4-4E55-98B6-FFAF34B74A40}" type="slidenum">
+              <a:rPr lang="en-US" smtClean="0"/>
+              <a:t>11</a:t>
+            </a:fld>
+            <a:endParaRPr lang="en-US"/>
+          </a:p>
+        </p:txBody>
+      </p:sp>
+    </p:spTree>
+    <p:extLst>
+      <p:ext uri="{BB962C8B-B14F-4D97-AF65-F5344CB8AC3E}">
+        <p14:creationId xmlns:p14="http://schemas.microsoft.com/office/powerpoint/2010/main" val="1444186417"/>
+      </p:ext>
+    </p:extLst>
+  </p:cSld>
+  <p:clrMapOvr>
+    <a:masterClrMapping/>
+  </p:clrMapOvr>
+</p:notes>
+</file>
+
+<file path=ppt/notesSlides/notesSlide12.xml><?xml version="1.0" encoding="utf-8"?>
+<p:notes xmlns:a="http://schemas.openxmlformats.org/drawingml/2006/main" xmlns:r="http://schemas.openxmlformats.org/officeDocument/2006/relationships" xmlns:p="http://schemas.openxmlformats.org/presentationml/2006/main">
+  <p:cSld>
+    <p:spTree>
+      <p:nvGrpSpPr>
+        <p:cNvPr id="1" name=""/>
+        <p:cNvGrpSpPr/>
+        <p:nvPr/>
+      </p:nvGrpSpPr>
+      <p:grpSpPr>
+        <a:xfrm>
+          <a:off x="0" y="0"/>
+          <a:ext cx="0" cy="0"/>
+          <a:chOff x="0" y="0"/>
+          <a:chExt cx="0" cy="0"/>
+        </a:xfrm>
+      </p:grpSpPr>
+      <p:sp>
+        <p:nvSpPr>
+          <p:cNvPr id="2" name="Slide Image Placeholder 1"/>
+          <p:cNvSpPr>
+            <a:spLocks noGrp="1" noRot="1" noChangeAspect="1"/>
+          </p:cNvSpPr>
+          <p:nvPr>
+            <p:ph type="sldImg"/>
+          </p:nvPr>
+        </p:nvSpPr>
+        <p:spPr/>
+      </p:sp>
+      <p:sp>
+        <p:nvSpPr>
+          <p:cNvPr id="3" name="Notes Placeholder 2"/>
+          <p:cNvSpPr>
+            <a:spLocks noGrp="1"/>
+          </p:cNvSpPr>
+          <p:nvPr>
+            <p:ph type="body" idx="1"/>
+          </p:nvPr>
+        </p:nvSpPr>
+        <p:spPr/>
+        <p:txBody>
+          <a:bodyPr/>
+          <a:lstStyle/>
+          <a:p>
+            <a:r>
+              <a:rPr lang="en-GB" dirty="0" err="1"/>
+              <a:t>Typy</a:t>
+            </a:r>
+            <a:r>
+              <a:rPr lang="en-GB" dirty="0"/>
+              <a:t> </a:t>
+            </a:r>
+            <a:r>
+              <a:rPr lang="en-GB" dirty="0" err="1"/>
+              <a:t>danych</a:t>
+            </a:r>
+            <a:r>
+              <a:rPr lang="en-GB" dirty="0"/>
+              <a:t> </a:t>
+            </a:r>
+            <a:r>
+              <a:rPr lang="en-GB" dirty="0" err="1"/>
+              <a:t>danych</a:t>
+            </a:r>
+            <a:r>
+              <a:rPr lang="en-GB" dirty="0"/>
+              <a:t> – to co </a:t>
+            </a:r>
+            <a:r>
+              <a:rPr lang="en-GB" dirty="0" err="1"/>
+              <a:t>znamy</a:t>
+            </a:r>
+            <a:r>
+              <a:rPr lang="en-GB" dirty="0"/>
+              <a:t> z C# </a:t>
+            </a:r>
+          </a:p>
+          <a:p>
+            <a:r>
+              <a:rPr lang="en-GB" dirty="0"/>
+              <a:t>+</a:t>
+            </a:r>
+          </a:p>
+          <a:p>
+            <a:r>
+              <a:rPr lang="en-GB" dirty="0"/>
+              <a:t>SQLARRAY I SQLMAP to </a:t>
+            </a:r>
+            <a:r>
+              <a:rPr lang="en-GB" dirty="0" err="1"/>
+              <a:t>znamy</a:t>
+            </a:r>
+            <a:r>
+              <a:rPr lang="en-GB" dirty="0"/>
+              <a:t> z Hive</a:t>
+            </a:r>
+          </a:p>
+          <a:p>
+            <a:r>
+              <a:rPr lang="en-GB" dirty="0"/>
+              <a:t>Poza </a:t>
+            </a:r>
+            <a:r>
+              <a:rPr lang="en-GB" dirty="0" err="1"/>
+              <a:t>tym</a:t>
+            </a:r>
+            <a:r>
+              <a:rPr lang="en-GB" dirty="0"/>
+              <a:t> </a:t>
+            </a:r>
+            <a:r>
+              <a:rPr lang="en-GB" dirty="0" err="1"/>
+              <a:t>mamy</a:t>
+            </a:r>
+            <a:r>
+              <a:rPr lang="en-GB" dirty="0"/>
+              <a:t> </a:t>
+            </a:r>
+            <a:r>
+              <a:rPr lang="en-GB" dirty="0" err="1"/>
+              <a:t>RowSets</a:t>
+            </a:r>
+            <a:r>
+              <a:rPr lang="en-GB" dirty="0"/>
+              <a:t> – </a:t>
+            </a:r>
+            <a:r>
+              <a:rPr lang="en-GB" dirty="0" err="1"/>
+              <a:t>odpowiednik</a:t>
+            </a:r>
+            <a:r>
+              <a:rPr lang="en-GB" dirty="0"/>
+              <a:t> </a:t>
+            </a:r>
+            <a:r>
+              <a:rPr lang="en-GB" dirty="0" err="1"/>
+              <a:t>tabeli</a:t>
+            </a:r>
+            <a:r>
+              <a:rPr lang="en-GB" dirty="0"/>
+              <a:t> w SQL (</a:t>
+            </a:r>
+            <a:r>
+              <a:rPr lang="en-GB" dirty="0" err="1"/>
+              <a:t>lub</a:t>
+            </a:r>
+            <a:r>
+              <a:rPr lang="en-GB" dirty="0"/>
+              <a:t> </a:t>
+            </a:r>
+            <a:r>
+              <a:rPr lang="en-GB" dirty="0" err="1"/>
+              <a:t>dataframe</a:t>
+            </a:r>
+            <a:r>
+              <a:rPr lang="en-GB" dirty="0"/>
+              <a:t> w </a:t>
+            </a:r>
+            <a:r>
+              <a:rPr lang="en-GB" dirty="0" err="1"/>
+              <a:t>pyton</a:t>
+            </a:r>
+            <a:r>
+              <a:rPr lang="en-GB" dirty="0"/>
+              <a:t> </a:t>
+            </a:r>
+            <a:r>
+              <a:rPr lang="en-GB" dirty="0" err="1"/>
+              <a:t>lub</a:t>
+            </a:r>
+            <a:r>
+              <a:rPr lang="en-GB" dirty="0"/>
+              <a:t> R)</a:t>
+            </a:r>
+            <a:endParaRPr lang="pl-PL" dirty="0"/>
+          </a:p>
+        </p:txBody>
+      </p:sp>
+      <p:sp>
+        <p:nvSpPr>
+          <p:cNvPr id="4" name="Slide Number Placeholder 3"/>
+          <p:cNvSpPr>
+            <a:spLocks noGrp="1"/>
+          </p:cNvSpPr>
+          <p:nvPr>
+            <p:ph type="sldNum" sz="quarter" idx="5"/>
+          </p:nvPr>
+        </p:nvSpPr>
+        <p:spPr/>
+        <p:txBody>
+          <a:bodyPr/>
+          <a:lstStyle/>
+          <a:p>
+            <a:fld id="{55992286-4AA4-4E55-98B6-FFAF34B74A40}" type="slidenum">
+              <a:rPr lang="en-US" smtClean="0"/>
+              <a:t>12</a:t>
+            </a:fld>
+            <a:endParaRPr lang="en-US"/>
+          </a:p>
+        </p:txBody>
+      </p:sp>
+    </p:spTree>
+    <p:extLst>
+      <p:ext uri="{BB962C8B-B14F-4D97-AF65-F5344CB8AC3E}">
+        <p14:creationId xmlns:p14="http://schemas.microsoft.com/office/powerpoint/2010/main" val="3389955009"/>
+      </p:ext>
+    </p:extLst>
+  </p:cSld>
+  <p:clrMapOvr>
+    <a:masterClrMapping/>
+  </p:clrMapOvr>
+</p:notes>
+</file>
+
+<file path=ppt/notesSlides/notesSlide13.xml><?xml version="1.0" encoding="utf-8"?>
+<p:notes xmlns:a="http://schemas.openxmlformats.org/drawingml/2006/main" xmlns:r="http://schemas.openxmlformats.org/officeDocument/2006/relationships" xmlns:p="http://schemas.openxmlformats.org/presentationml/2006/main">
+  <p:cSld>
+    <p:spTree>
+      <p:nvGrpSpPr>
+        <p:cNvPr id="1" name=""/>
+        <p:cNvGrpSpPr/>
+        <p:nvPr/>
+      </p:nvGrpSpPr>
+      <p:grpSpPr>
+        <a:xfrm>
+          <a:off x="0" y="0"/>
+          <a:ext cx="0" cy="0"/>
+          <a:chOff x="0" y="0"/>
+          <a:chExt cx="0" cy="0"/>
+        </a:xfrm>
+      </p:grpSpPr>
+      <p:sp>
+        <p:nvSpPr>
+          <p:cNvPr id="2" name="Slide Image Placeholder 1"/>
+          <p:cNvSpPr>
+            <a:spLocks noGrp="1" noRot="1" noChangeAspect="1"/>
+          </p:cNvSpPr>
+          <p:nvPr>
+            <p:ph type="sldImg"/>
+          </p:nvPr>
+        </p:nvSpPr>
+        <p:spPr/>
+      </p:sp>
+      <p:sp>
+        <p:nvSpPr>
+          <p:cNvPr id="3" name="Notes Placeholder 2"/>
+          <p:cNvSpPr>
+            <a:spLocks noGrp="1"/>
+          </p:cNvSpPr>
+          <p:nvPr>
+            <p:ph type="body" idx="1"/>
+          </p:nvPr>
+        </p:nvSpPr>
+        <p:spPr/>
+        <p:txBody>
+          <a:bodyPr/>
+          <a:lstStyle/>
+          <a:p>
+            <a:r>
+              <a:rPr lang="en-GB" dirty="0" err="1"/>
+              <a:t>Jak</a:t>
+            </a:r>
+            <a:r>
+              <a:rPr lang="en-GB" dirty="0"/>
+              <a:t> </a:t>
+            </a:r>
+            <a:r>
+              <a:rPr lang="en-GB" dirty="0" err="1"/>
+              <a:t>ktos</a:t>
+            </a:r>
+            <a:r>
+              <a:rPr lang="en-GB" dirty="0"/>
+              <a:t> jest </a:t>
+            </a:r>
+            <a:r>
+              <a:rPr lang="en-GB" dirty="0" err="1"/>
+              <a:t>programista</a:t>
+            </a:r>
+            <a:r>
+              <a:rPr lang="en-GB" dirty="0"/>
+              <a:t> SQL to </a:t>
+            </a:r>
+            <a:r>
+              <a:rPr lang="en-GB" dirty="0" err="1"/>
+              <a:t>moze</a:t>
+            </a:r>
+            <a:r>
+              <a:rPr lang="en-GB" dirty="0"/>
+              <a:t> go </a:t>
+            </a:r>
+            <a:r>
+              <a:rPr lang="en-GB" dirty="0" err="1"/>
+              <a:t>spotkac</a:t>
+            </a:r>
+            <a:r>
+              <a:rPr lang="en-GB" dirty="0"/>
+              <a:t> </a:t>
+            </a:r>
+            <a:r>
+              <a:rPr lang="en-GB" dirty="0" err="1"/>
+              <a:t>kilka</a:t>
+            </a:r>
+            <a:r>
+              <a:rPr lang="en-GB" dirty="0"/>
+              <a:t> </a:t>
+            </a:r>
+            <a:r>
+              <a:rPr lang="en-GB" dirty="0" err="1"/>
+              <a:t>niespodzianek</a:t>
+            </a:r>
+            <a:endParaRPr lang="pl-PL" dirty="0"/>
+          </a:p>
+        </p:txBody>
+      </p:sp>
+      <p:sp>
+        <p:nvSpPr>
+          <p:cNvPr id="4" name="Slide Number Placeholder 3"/>
+          <p:cNvSpPr>
+            <a:spLocks noGrp="1"/>
+          </p:cNvSpPr>
+          <p:nvPr>
+            <p:ph type="sldNum" sz="quarter" idx="5"/>
+          </p:nvPr>
+        </p:nvSpPr>
+        <p:spPr/>
+        <p:txBody>
+          <a:bodyPr/>
+          <a:lstStyle/>
+          <a:p>
+            <a:fld id="{55992286-4AA4-4E55-98B6-FFAF34B74A40}" type="slidenum">
+              <a:rPr lang="en-US" smtClean="0"/>
+              <a:t>13</a:t>
+            </a:fld>
+            <a:endParaRPr lang="en-US"/>
+          </a:p>
+        </p:txBody>
+      </p:sp>
+    </p:spTree>
+    <p:extLst>
+      <p:ext uri="{BB962C8B-B14F-4D97-AF65-F5344CB8AC3E}">
+        <p14:creationId xmlns:p14="http://schemas.microsoft.com/office/powerpoint/2010/main" val="3948492468"/>
+      </p:ext>
+    </p:extLst>
+  </p:cSld>
+  <p:clrMapOvr>
+    <a:masterClrMapping/>
+  </p:clrMapOvr>
+</p:notes>
+</file>
+
+<file path=ppt/notesSlides/notesSlide14.xml><?xml version="1.0" encoding="utf-8"?>
+<p:notes xmlns:a="http://schemas.openxmlformats.org/drawingml/2006/main" xmlns:r="http://schemas.openxmlformats.org/officeDocument/2006/relationships" xmlns:p="http://schemas.openxmlformats.org/presentationml/2006/main">
+  <p:cSld>
+    <p:spTree>
+      <p:nvGrpSpPr>
+        <p:cNvPr id="1" name=""/>
+        <p:cNvGrpSpPr/>
+        <p:nvPr/>
+      </p:nvGrpSpPr>
+      <p:grpSpPr>
+        <a:xfrm>
+          <a:off x="0" y="0"/>
+          <a:ext cx="0" cy="0"/>
+          <a:chOff x="0" y="0"/>
+          <a:chExt cx="0" cy="0"/>
+        </a:xfrm>
+      </p:grpSpPr>
+      <p:sp>
+        <p:nvSpPr>
+          <p:cNvPr id="2" name="Slide Image Placeholder 1"/>
+          <p:cNvSpPr>
+            <a:spLocks noGrp="1" noRot="1" noChangeAspect="1"/>
+          </p:cNvSpPr>
+          <p:nvPr>
+            <p:ph type="sldImg"/>
+          </p:nvPr>
+        </p:nvSpPr>
+        <p:spPr/>
+      </p:sp>
+      <p:sp>
+        <p:nvSpPr>
+          <p:cNvPr id="3" name="Notes Placeholder 2"/>
+          <p:cNvSpPr>
+            <a:spLocks noGrp="1"/>
+          </p:cNvSpPr>
+          <p:nvPr>
+            <p:ph type="body" idx="1"/>
+          </p:nvPr>
+        </p:nvSpPr>
+        <p:spPr/>
+        <p:txBody>
+          <a:bodyPr/>
+          <a:lstStyle/>
+          <a:p>
+            <a:r>
+              <a:rPr lang="en-GB" dirty="0" err="1"/>
+              <a:t>Rozszerzenia</a:t>
+            </a:r>
+            <a:endParaRPr lang="en-GB" dirty="0"/>
+          </a:p>
+          <a:p>
+            <a:r>
+              <a:rPr lang="en-GB" dirty="0"/>
+              <a:t>Extractors </a:t>
+            </a:r>
+            <a:r>
+              <a:rPr lang="en-GB" dirty="0" err="1"/>
+              <a:t>mamy</a:t>
+            </a:r>
+            <a:r>
+              <a:rPr lang="en-GB" dirty="0"/>
+              <a:t> 4 </a:t>
+            </a:r>
+            <a:r>
+              <a:rPr lang="en-GB" dirty="0" err="1"/>
+              <a:t>CVS,TSV,Text</a:t>
+            </a:r>
+            <a:r>
+              <a:rPr lang="en-GB" dirty="0"/>
+              <a:t>, Parquet –</a:t>
+            </a:r>
+            <a:r>
+              <a:rPr lang="en-GB" dirty="0" err="1"/>
+              <a:t>pokazmy</a:t>
+            </a:r>
+            <a:r>
+              <a:rPr lang="en-GB" dirty="0"/>
+              <a:t> </a:t>
+            </a:r>
+            <a:r>
+              <a:rPr lang="en-GB" dirty="0" err="1"/>
+              <a:t>jak</a:t>
+            </a:r>
+            <a:r>
+              <a:rPr lang="en-GB" dirty="0"/>
+              <a:t> </a:t>
+            </a:r>
+            <a:r>
+              <a:rPr lang="en-GB" dirty="0" err="1"/>
+              <a:t>pisac</a:t>
+            </a:r>
+            <a:endParaRPr lang="pl-PL" dirty="0"/>
+          </a:p>
+        </p:txBody>
+      </p:sp>
+      <p:sp>
+        <p:nvSpPr>
+          <p:cNvPr id="4" name="Slide Number Placeholder 3"/>
+          <p:cNvSpPr>
+            <a:spLocks noGrp="1"/>
+          </p:cNvSpPr>
+          <p:nvPr>
+            <p:ph type="sldNum" sz="quarter" idx="5"/>
+          </p:nvPr>
+        </p:nvSpPr>
+        <p:spPr/>
+        <p:txBody>
+          <a:bodyPr/>
+          <a:lstStyle/>
+          <a:p>
+            <a:fld id="{55992286-4AA4-4E55-98B6-FFAF34B74A40}" type="slidenum">
+              <a:rPr lang="en-US" smtClean="0"/>
+              <a:t>14</a:t>
+            </a:fld>
+            <a:endParaRPr lang="en-US"/>
+          </a:p>
+        </p:txBody>
+      </p:sp>
+    </p:spTree>
+    <p:extLst>
+      <p:ext uri="{BB962C8B-B14F-4D97-AF65-F5344CB8AC3E}">
+        <p14:creationId xmlns:p14="http://schemas.microsoft.com/office/powerpoint/2010/main" val="70246221"/>
+      </p:ext>
+    </p:extLst>
+  </p:cSld>
+  <p:clrMapOvr>
+    <a:masterClrMapping/>
+  </p:clrMapOvr>
+</p:notes>
+</file>
+
+<file path=ppt/notesSlides/notesSlide15.xml><?xml version="1.0" encoding="utf-8"?>
+<p:notes xmlns:a="http://schemas.openxmlformats.org/drawingml/2006/main" xmlns:r="http://schemas.openxmlformats.org/officeDocument/2006/relationships" xmlns:p="http://schemas.openxmlformats.org/presentationml/2006/main">
+  <p:cSld>
+    <p:spTree>
+      <p:nvGrpSpPr>
+        <p:cNvPr id="1" name=""/>
+        <p:cNvGrpSpPr/>
+        <p:nvPr/>
+      </p:nvGrpSpPr>
+      <p:grpSpPr>
+        <a:xfrm>
+          <a:off x="0" y="0"/>
+          <a:ext cx="0" cy="0"/>
+          <a:chOff x="0" y="0"/>
+          <a:chExt cx="0" cy="0"/>
+        </a:xfrm>
+      </p:grpSpPr>
+      <p:sp>
+        <p:nvSpPr>
+          <p:cNvPr id="2" name="Slide Image Placeholder 1"/>
+          <p:cNvSpPr>
+            <a:spLocks noGrp="1" noRot="1" noChangeAspect="1"/>
+          </p:cNvSpPr>
+          <p:nvPr>
+            <p:ph type="sldImg"/>
+          </p:nvPr>
+        </p:nvSpPr>
+        <p:spPr/>
+      </p:sp>
+      <p:sp>
+        <p:nvSpPr>
+          <p:cNvPr id="3" name="Notes Placeholder 2"/>
+          <p:cNvSpPr>
+            <a:spLocks noGrp="1"/>
+          </p:cNvSpPr>
+          <p:nvPr>
+            <p:ph type="body" idx="1"/>
+          </p:nvPr>
+        </p:nvSpPr>
+        <p:spPr/>
+        <p:txBody>
+          <a:bodyPr/>
+          <a:lstStyle/>
+          <a:p>
+            <a:r>
+              <a:rPr lang="en-GB" dirty="0" err="1"/>
+              <a:t>Integracja</a:t>
+            </a:r>
+            <a:r>
+              <a:rPr lang="en-GB" dirty="0"/>
+              <a:t> z .NET </a:t>
+            </a:r>
+            <a:endParaRPr lang="pl-PL" dirty="0"/>
+          </a:p>
+        </p:txBody>
+      </p:sp>
+      <p:sp>
+        <p:nvSpPr>
+          <p:cNvPr id="4" name="Slide Number Placeholder 3"/>
+          <p:cNvSpPr>
+            <a:spLocks noGrp="1"/>
+          </p:cNvSpPr>
+          <p:nvPr>
+            <p:ph type="sldNum" sz="quarter" idx="5"/>
+          </p:nvPr>
+        </p:nvSpPr>
+        <p:spPr/>
+        <p:txBody>
+          <a:bodyPr/>
+          <a:lstStyle/>
+          <a:p>
+            <a:fld id="{55992286-4AA4-4E55-98B6-FFAF34B74A40}" type="slidenum">
+              <a:rPr lang="en-US" smtClean="0"/>
+              <a:t>15</a:t>
+            </a:fld>
+            <a:endParaRPr lang="en-US"/>
+          </a:p>
+        </p:txBody>
+      </p:sp>
+    </p:spTree>
+    <p:extLst>
+      <p:ext uri="{BB962C8B-B14F-4D97-AF65-F5344CB8AC3E}">
+        <p14:creationId xmlns:p14="http://schemas.microsoft.com/office/powerpoint/2010/main" val="1347526348"/>
+      </p:ext>
+    </p:extLst>
+  </p:cSld>
+  <p:clrMapOvr>
+    <a:masterClrMapping/>
+  </p:clrMapOvr>
+</p:notes>
+</file>
+
+<file path=ppt/notesSlides/notesSlide16.xml><?xml version="1.0" encoding="utf-8"?>
+<p:notes xmlns:a="http://schemas.openxmlformats.org/drawingml/2006/main" xmlns:r="http://schemas.openxmlformats.org/officeDocument/2006/relationships" xmlns:p="http://schemas.openxmlformats.org/presentationml/2006/main">
+  <p:cSld>
+    <p:spTree>
+      <p:nvGrpSpPr>
+        <p:cNvPr id="1" name=""/>
+        <p:cNvGrpSpPr/>
+        <p:nvPr/>
+      </p:nvGrpSpPr>
+      <p:grpSpPr>
+        <a:xfrm>
+          <a:off x="0" y="0"/>
+          <a:ext cx="0" cy="0"/>
+          <a:chOff x="0" y="0"/>
+          <a:chExt cx="0" cy="0"/>
+        </a:xfrm>
+      </p:grpSpPr>
+      <p:sp>
+        <p:nvSpPr>
+          <p:cNvPr id="2" name="Slide Image Placeholder 1"/>
+          <p:cNvSpPr>
+            <a:spLocks noGrp="1" noRot="1" noChangeAspect="1"/>
+          </p:cNvSpPr>
+          <p:nvPr>
+            <p:ph type="sldImg"/>
+          </p:nvPr>
+        </p:nvSpPr>
+        <p:spPr/>
+      </p:sp>
+      <p:sp>
+        <p:nvSpPr>
+          <p:cNvPr id="3" name="Notes Placeholder 2"/>
+          <p:cNvSpPr>
+            <a:spLocks noGrp="1"/>
+          </p:cNvSpPr>
+          <p:nvPr>
+            <p:ph type="body" idx="1"/>
+          </p:nvPr>
+        </p:nvSpPr>
+        <p:spPr/>
+        <p:txBody>
+          <a:bodyPr/>
+          <a:lstStyle/>
+          <a:p>
+            <a:endParaRPr lang="pl-PL" dirty="0"/>
+          </a:p>
+        </p:txBody>
+      </p:sp>
+      <p:sp>
+        <p:nvSpPr>
+          <p:cNvPr id="4" name="Slide Number Placeholder 3"/>
+          <p:cNvSpPr>
+            <a:spLocks noGrp="1"/>
+          </p:cNvSpPr>
+          <p:nvPr>
+            <p:ph type="sldNum" sz="quarter" idx="5"/>
+          </p:nvPr>
+        </p:nvSpPr>
+        <p:spPr/>
+        <p:txBody>
+          <a:bodyPr/>
+          <a:lstStyle/>
+          <a:p>
+            <a:fld id="{55992286-4AA4-4E55-98B6-FFAF34B74A40}" type="slidenum">
+              <a:rPr lang="en-US" smtClean="0"/>
+              <a:t>16</a:t>
+            </a:fld>
+            <a:endParaRPr lang="en-US"/>
+          </a:p>
+        </p:txBody>
+      </p:sp>
+    </p:spTree>
+    <p:extLst>
+      <p:ext uri="{BB962C8B-B14F-4D97-AF65-F5344CB8AC3E}">
+        <p14:creationId xmlns:p14="http://schemas.microsoft.com/office/powerpoint/2010/main" val="2177714318"/>
+      </p:ext>
+    </p:extLst>
+  </p:cSld>
+  <p:clrMapOvr>
+    <a:masterClrMapping/>
+  </p:clrMapOvr>
+</p:notes>
+</file>
+
+<file path=ppt/notesSlides/notesSlide17.xml><?xml version="1.0" encoding="utf-8"?>
+<p:notes xmlns:a="http://schemas.openxmlformats.org/drawingml/2006/main" xmlns:r="http://schemas.openxmlformats.org/officeDocument/2006/relationships" xmlns:p="http://schemas.openxmlformats.org/presentationml/2006/main">
+  <p:cSld>
+    <p:spTree>
+      <p:nvGrpSpPr>
+        <p:cNvPr id="1" name=""/>
+        <p:cNvGrpSpPr/>
+        <p:nvPr/>
+      </p:nvGrpSpPr>
+      <p:grpSpPr>
+        <a:xfrm>
+          <a:off x="0" y="0"/>
+          <a:ext cx="0" cy="0"/>
+          <a:chOff x="0" y="0"/>
+          <a:chExt cx="0" cy="0"/>
+        </a:xfrm>
+      </p:grpSpPr>
+      <p:sp>
+        <p:nvSpPr>
+          <p:cNvPr id="2" name="Slide Image Placeholder 1"/>
+          <p:cNvSpPr>
+            <a:spLocks noGrp="1" noRot="1" noChangeAspect="1"/>
+          </p:cNvSpPr>
+          <p:nvPr>
+            <p:ph type="sldImg"/>
+          </p:nvPr>
+        </p:nvSpPr>
+        <p:spPr/>
+      </p:sp>
+      <p:sp>
+        <p:nvSpPr>
+          <p:cNvPr id="3" name="Notes Placeholder 2"/>
+          <p:cNvSpPr>
+            <a:spLocks noGrp="1"/>
+          </p:cNvSpPr>
+          <p:nvPr>
+            <p:ph type="body" idx="1"/>
+          </p:nvPr>
+        </p:nvSpPr>
+        <p:spPr/>
+        <p:txBody>
+          <a:bodyPr/>
+          <a:lstStyle/>
+          <a:p>
+            <a:r>
+              <a:rPr lang="en-GB" dirty="0" err="1"/>
+              <a:t>Jak</a:t>
+            </a:r>
+            <a:r>
+              <a:rPr lang="en-GB" dirty="0"/>
+              <a:t> to </a:t>
+            </a:r>
+            <a:r>
+              <a:rPr lang="en-GB" dirty="0" err="1"/>
+              <a:t>dziala</a:t>
+            </a:r>
+            <a:endParaRPr lang="en-GB" dirty="0"/>
+          </a:p>
+          <a:p>
+            <a:r>
+              <a:rPr lang="en-GB" dirty="0" err="1"/>
+              <a:t>Nasz</a:t>
+            </a:r>
+            <a:r>
+              <a:rPr lang="en-GB" dirty="0"/>
+              <a:t> </a:t>
+            </a:r>
+            <a:r>
+              <a:rPr lang="en-GB" dirty="0" err="1"/>
+              <a:t>skrypt</a:t>
+            </a:r>
+            <a:r>
+              <a:rPr lang="en-GB" dirty="0"/>
+              <a:t> w U-SQL jest </a:t>
+            </a:r>
+            <a:r>
+              <a:rPr lang="en-GB" dirty="0" err="1"/>
+              <a:t>kompilowany</a:t>
+            </a:r>
+            <a:r>
+              <a:rPr lang="en-GB" dirty="0"/>
+              <a:t> I </a:t>
+            </a:r>
+            <a:r>
+              <a:rPr lang="en-GB" dirty="0" err="1"/>
+              <a:t>optymalizowany</a:t>
+            </a:r>
+            <a:r>
+              <a:rPr lang="en-GB" dirty="0"/>
+              <a:t> do managed code </a:t>
+            </a:r>
+            <a:r>
+              <a:rPr lang="en-GB" dirty="0" err="1"/>
+              <a:t>oraz</a:t>
+            </a:r>
+            <a:r>
+              <a:rPr lang="en-GB" dirty="0"/>
+              <a:t> </a:t>
+            </a:r>
+            <a:r>
+              <a:rPr lang="en-GB" dirty="0" err="1"/>
+              <a:t>unmanagement</a:t>
+            </a:r>
+            <a:r>
+              <a:rPr lang="en-GB" dirty="0"/>
+              <a:t> Code (aby </a:t>
+            </a:r>
+            <a:r>
+              <a:rPr lang="en-GB" dirty="0" err="1"/>
+              <a:t>bylo</a:t>
+            </a:r>
+            <a:r>
+              <a:rPr lang="en-GB" dirty="0"/>
+              <a:t> </a:t>
+            </a:r>
+            <a:r>
+              <a:rPr lang="en-GB" dirty="0" err="1"/>
+              <a:t>szybciej</a:t>
+            </a:r>
+            <a:r>
+              <a:rPr lang="en-GB" dirty="0"/>
+              <a:t> </a:t>
+            </a:r>
+            <a:r>
+              <a:rPr lang="en-GB" dirty="0" err="1"/>
+              <a:t>jesli</a:t>
+            </a:r>
+            <a:r>
+              <a:rPr lang="en-GB" dirty="0"/>
+              <a:t> </a:t>
+            </a:r>
+            <a:r>
+              <a:rPr lang="en-GB" dirty="0" err="1"/>
+              <a:t>nie</a:t>
+            </a:r>
+            <a:r>
+              <a:rPr lang="en-GB" dirty="0"/>
+              <a:t> </a:t>
+            </a:r>
+            <a:r>
+              <a:rPr lang="en-GB" dirty="0" err="1"/>
+              <a:t>uzywamy</a:t>
+            </a:r>
+            <a:r>
+              <a:rPr lang="en-GB" dirty="0"/>
+              <a:t> </a:t>
+            </a:r>
+            <a:r>
+              <a:rPr lang="en-GB" dirty="0" err="1"/>
+              <a:t>rozszerzen</a:t>
+            </a:r>
+            <a:r>
+              <a:rPr lang="en-GB" dirty="0"/>
+              <a:t> </a:t>
+            </a:r>
+            <a:r>
+              <a:rPr lang="en-GB" dirty="0" err="1"/>
+              <a:t>.Net</a:t>
+            </a:r>
+            <a:r>
+              <a:rPr lang="en-GB" dirty="0"/>
+              <a:t>)</a:t>
+            </a:r>
+          </a:p>
+          <a:p>
+            <a:r>
+              <a:rPr lang="en-GB" dirty="0" err="1"/>
+              <a:t>Nastepnie</a:t>
+            </a:r>
+            <a:r>
+              <a:rPr lang="en-GB" dirty="0"/>
+              <a:t> </a:t>
+            </a:r>
+            <a:r>
+              <a:rPr lang="en-GB" dirty="0" err="1"/>
+              <a:t>skompilowny</a:t>
+            </a:r>
+            <a:r>
+              <a:rPr lang="en-GB" dirty="0"/>
+              <a:t> </a:t>
+            </a:r>
+            <a:r>
+              <a:rPr lang="en-GB" dirty="0" err="1"/>
+              <a:t>kod</a:t>
+            </a:r>
+            <a:r>
+              <a:rPr lang="en-GB" dirty="0"/>
+              <a:t> </a:t>
+            </a:r>
+            <a:r>
+              <a:rPr lang="en-GB" dirty="0" err="1"/>
+              <a:t>jej</a:t>
+            </a:r>
+            <a:r>
+              <a:rPr lang="en-GB" dirty="0"/>
+              <a:t> </a:t>
+            </a:r>
+            <a:r>
+              <a:rPr lang="en-GB" dirty="0" err="1"/>
+              <a:t>deployowany</a:t>
+            </a:r>
+            <a:r>
+              <a:rPr lang="en-GB" dirty="0"/>
+              <a:t> </a:t>
+            </a:r>
+            <a:r>
+              <a:rPr lang="en-GB" dirty="0" err="1"/>
+              <a:t>na</a:t>
+            </a:r>
+            <a:r>
+              <a:rPr lang="en-GB" dirty="0"/>
+              <a:t> </a:t>
+            </a:r>
+            <a:r>
+              <a:rPr lang="en-GB" dirty="0" err="1"/>
+              <a:t>nasz</a:t>
+            </a:r>
+            <a:r>
+              <a:rPr lang="en-GB" dirty="0"/>
+              <a:t> </a:t>
+            </a:r>
+            <a:r>
+              <a:rPr lang="en-GB" dirty="0" err="1"/>
+              <a:t>Vertexy</a:t>
+            </a:r>
+            <a:r>
+              <a:rPr lang="en-GB" dirty="0"/>
+              <a:t> </a:t>
+            </a:r>
+          </a:p>
+          <a:p>
+            <a:r>
+              <a:rPr lang="en-GB" dirty="0"/>
+              <a:t>Co jest </a:t>
+            </a:r>
+            <a:r>
+              <a:rPr lang="en-GB" dirty="0" err="1"/>
+              <a:t>deployowane</a:t>
+            </a:r>
+            <a:r>
+              <a:rPr lang="en-GB" dirty="0"/>
+              <a:t> </a:t>
+            </a:r>
+          </a:p>
+          <a:p>
+            <a:r>
+              <a:rPr lang="en-GB" dirty="0" err="1"/>
+              <a:t>Nasze</a:t>
+            </a:r>
+            <a:r>
+              <a:rPr lang="en-GB" dirty="0"/>
+              <a:t> assembly </a:t>
+            </a:r>
+          </a:p>
+          <a:p>
+            <a:r>
+              <a:rPr lang="en-GB" dirty="0"/>
+              <a:t>R, Python, </a:t>
+            </a:r>
+            <a:r>
+              <a:rPr lang="en-GB" dirty="0" err="1"/>
+              <a:t>Cognitve</a:t>
+            </a:r>
+            <a:r>
+              <a:rPr lang="en-GB" dirty="0"/>
+              <a:t> </a:t>
+            </a:r>
+            <a:r>
+              <a:rPr lang="en-GB" dirty="0" err="1"/>
+              <a:t>jesli</a:t>
+            </a:r>
+            <a:r>
+              <a:rPr lang="en-GB" dirty="0"/>
+              <a:t> </a:t>
+            </a:r>
+            <a:r>
+              <a:rPr lang="en-GB" dirty="0" err="1"/>
+              <a:t>uzywamy</a:t>
+            </a:r>
+            <a:endParaRPr lang="en-GB" dirty="0"/>
+          </a:p>
+          <a:p>
+            <a:r>
+              <a:rPr lang="en-GB" dirty="0" err="1"/>
+              <a:t>Dodatkowe</a:t>
+            </a:r>
+            <a:r>
+              <a:rPr lang="en-GB" dirty="0"/>
+              <a:t> resource np. </a:t>
+            </a:r>
+            <a:r>
+              <a:rPr lang="en-GB" dirty="0" err="1"/>
+              <a:t>Modele</a:t>
+            </a:r>
+            <a:r>
+              <a:rPr lang="en-GB" dirty="0"/>
+              <a:t> ML</a:t>
+            </a:r>
+          </a:p>
+          <a:p>
+            <a:r>
+              <a:rPr lang="en-GB" dirty="0"/>
+              <a:t>I tam jest </a:t>
+            </a:r>
+            <a:r>
+              <a:rPr lang="en-GB" dirty="0" err="1"/>
+              <a:t>wykonywany</a:t>
+            </a:r>
+            <a:endParaRPr lang="pl-PL" dirty="0"/>
+          </a:p>
+        </p:txBody>
+      </p:sp>
+      <p:sp>
+        <p:nvSpPr>
+          <p:cNvPr id="4" name="Slide Number Placeholder 3"/>
+          <p:cNvSpPr>
+            <a:spLocks noGrp="1"/>
+          </p:cNvSpPr>
+          <p:nvPr>
+            <p:ph type="sldNum" sz="quarter" idx="5"/>
+          </p:nvPr>
+        </p:nvSpPr>
+        <p:spPr/>
+        <p:txBody>
+          <a:bodyPr/>
+          <a:lstStyle/>
+          <a:p>
+            <a:fld id="{55992286-4AA4-4E55-98B6-FFAF34B74A40}" type="slidenum">
+              <a:rPr lang="en-US" smtClean="0"/>
+              <a:t>19</a:t>
+            </a:fld>
+            <a:endParaRPr lang="en-US"/>
+          </a:p>
+        </p:txBody>
+      </p:sp>
+    </p:spTree>
+    <p:extLst>
+      <p:ext uri="{BB962C8B-B14F-4D97-AF65-F5344CB8AC3E}">
+        <p14:creationId xmlns:p14="http://schemas.microsoft.com/office/powerpoint/2010/main" val="161347676"/>
+      </p:ext>
+    </p:extLst>
+  </p:cSld>
+  <p:clrMapOvr>
+    <a:masterClrMapping/>
+  </p:clrMapOvr>
+</p:notes>
+</file>
+
+<file path=ppt/notesSlides/notesSlide2.xml><?xml version="1.0" encoding="utf-8"?>
+<p:notes xmlns:a="http://schemas.openxmlformats.org/drawingml/2006/main" xmlns:r="http://schemas.openxmlformats.org/officeDocument/2006/relationships" xmlns:p="http://schemas.openxmlformats.org/presentationml/2006/main">
+  <p:cSld>
+    <p:spTree>
+      <p:nvGrpSpPr>
+        <p:cNvPr id="1" name=""/>
+        <p:cNvGrpSpPr/>
+        <p:nvPr/>
+      </p:nvGrpSpPr>
+      <p:grpSpPr>
+        <a:xfrm>
+          <a:off x="0" y="0"/>
+          <a:ext cx="0" cy="0"/>
+          <a:chOff x="0" y="0"/>
+          <a:chExt cx="0" cy="0"/>
+        </a:xfrm>
+      </p:grpSpPr>
+      <p:sp>
+        <p:nvSpPr>
+          <p:cNvPr id="2" name="Slide Image Placeholder 1"/>
+          <p:cNvSpPr>
+            <a:spLocks noGrp="1" noRot="1" noChangeAspect="1"/>
+          </p:cNvSpPr>
+          <p:nvPr>
+            <p:ph type="sldImg"/>
+          </p:nvPr>
+        </p:nvSpPr>
+        <p:spPr/>
+      </p:sp>
+      <p:sp>
+        <p:nvSpPr>
+          <p:cNvPr id="3" name="Notes Placeholder 2"/>
+          <p:cNvSpPr>
+            <a:spLocks noGrp="1"/>
+          </p:cNvSpPr>
+          <p:nvPr>
+            <p:ph type="body" idx="1"/>
+          </p:nvPr>
+        </p:nvSpPr>
+        <p:spPr/>
+        <p:txBody>
+          <a:bodyPr/>
+          <a:lstStyle/>
+          <a:p>
+            <a:r>
+              <a:rPr lang="en-GB" dirty="0" err="1"/>
+              <a:t>Czy</a:t>
+            </a:r>
+            <a:r>
+              <a:rPr lang="en-GB" dirty="0"/>
+              <a:t> </a:t>
+            </a:r>
+            <a:r>
+              <a:rPr lang="en-GB" dirty="0" err="1"/>
+              <a:t>wiecie</a:t>
+            </a:r>
+            <a:r>
+              <a:rPr lang="en-GB" dirty="0"/>
+              <a:t> </a:t>
+            </a:r>
+            <a:r>
+              <a:rPr lang="en-GB" dirty="0" err="1"/>
+              <a:t>czemu</a:t>
+            </a:r>
+            <a:r>
+              <a:rPr lang="en-GB" dirty="0"/>
+              <a:t> </a:t>
+            </a:r>
+            <a:r>
+              <a:rPr lang="en-GB" dirty="0" err="1"/>
+              <a:t>słon</a:t>
+            </a:r>
+            <a:r>
+              <a:rPr lang="en-GB" dirty="0"/>
+              <a:t> ma </a:t>
+            </a:r>
+            <a:r>
+              <a:rPr lang="en-GB" dirty="0" err="1"/>
+              <a:t>trabe</a:t>
+            </a:r>
+            <a:endParaRPr lang="en-GB" dirty="0"/>
+          </a:p>
+          <a:p>
+            <a:r>
+              <a:rPr lang="en-GB" dirty="0" err="1"/>
+              <a:t>Zeby</a:t>
+            </a:r>
+            <a:r>
+              <a:rPr lang="en-GB" dirty="0"/>
+              <a:t> </a:t>
+            </a:r>
+            <a:r>
+              <a:rPr lang="en-GB" dirty="0" err="1"/>
+              <a:t>sie</a:t>
+            </a:r>
+            <a:r>
+              <a:rPr lang="en-GB" dirty="0"/>
+              <a:t> </a:t>
+            </a:r>
+            <a:r>
+              <a:rPr lang="en-GB" dirty="0" err="1"/>
+              <a:t>tak</a:t>
+            </a:r>
+            <a:r>
+              <a:rPr lang="en-GB" dirty="0"/>
+              <a:t> </a:t>
+            </a:r>
+            <a:r>
+              <a:rPr lang="en-GB" dirty="0" err="1"/>
+              <a:t>gwaltownie</a:t>
+            </a:r>
+            <a:r>
+              <a:rPr lang="en-GB" dirty="0"/>
+              <a:t> </a:t>
+            </a:r>
+            <a:r>
+              <a:rPr lang="en-GB" dirty="0" err="1"/>
+              <a:t>niezycznal</a:t>
+            </a:r>
+            <a:endParaRPr lang="pl-PL" dirty="0"/>
+          </a:p>
+        </p:txBody>
+      </p:sp>
+      <p:sp>
+        <p:nvSpPr>
+          <p:cNvPr id="4" name="Slide Number Placeholder 3"/>
+          <p:cNvSpPr>
+            <a:spLocks noGrp="1"/>
+          </p:cNvSpPr>
+          <p:nvPr>
+            <p:ph type="sldNum" sz="quarter" idx="5"/>
+          </p:nvPr>
+        </p:nvSpPr>
+        <p:spPr/>
+        <p:txBody>
+          <a:bodyPr/>
+          <a:lstStyle/>
+          <a:p>
+            <a:fld id="{55992286-4AA4-4E55-98B6-FFAF34B74A40}" type="slidenum">
+              <a:rPr lang="en-US" smtClean="0"/>
+              <a:t>2</a:t>
+            </a:fld>
+            <a:endParaRPr lang="en-US"/>
+          </a:p>
+        </p:txBody>
+      </p:sp>
+    </p:spTree>
+    <p:extLst>
+      <p:ext uri="{BB962C8B-B14F-4D97-AF65-F5344CB8AC3E}">
+        <p14:creationId xmlns:p14="http://schemas.microsoft.com/office/powerpoint/2010/main" val="3077909059"/>
+      </p:ext>
+    </p:extLst>
+  </p:cSld>
+  <p:clrMapOvr>
+    <a:masterClrMapping/>
+  </p:clrMapOvr>
+</p:notes>
+</file>
+
+<file path=ppt/notesSlides/notesSlide3.xml><?xml version="1.0" encoding="utf-8"?>
+<p:notes xmlns:a="http://schemas.openxmlformats.org/drawingml/2006/main" xmlns:r="http://schemas.openxmlformats.org/officeDocument/2006/relationships" xmlns:p="http://schemas.openxmlformats.org/presentationml/2006/main">
+  <p:cSld>
+    <p:spTree>
+      <p:nvGrpSpPr>
+        <p:cNvPr id="1" name=""/>
+        <p:cNvGrpSpPr/>
+        <p:nvPr/>
+      </p:nvGrpSpPr>
+      <p:grpSpPr>
+        <a:xfrm>
+          <a:off x="0" y="0"/>
+          <a:ext cx="0" cy="0"/>
+          <a:chOff x="0" y="0"/>
+          <a:chExt cx="0" cy="0"/>
+        </a:xfrm>
+      </p:grpSpPr>
+      <p:sp>
+        <p:nvSpPr>
+          <p:cNvPr id="2" name="Slide Image Placeholder 1"/>
+          <p:cNvSpPr>
+            <a:spLocks noGrp="1" noRot="1" noChangeAspect="1"/>
+          </p:cNvSpPr>
+          <p:nvPr>
+            <p:ph type="sldImg"/>
+          </p:nvPr>
+        </p:nvSpPr>
+        <p:spPr/>
+      </p:sp>
+      <p:sp>
+        <p:nvSpPr>
+          <p:cNvPr id="3" name="Notes Placeholder 2"/>
+          <p:cNvSpPr>
+            <a:spLocks noGrp="1"/>
+          </p:cNvSpPr>
+          <p:nvPr>
+            <p:ph type="body" idx="1"/>
+          </p:nvPr>
+        </p:nvSpPr>
+        <p:spPr/>
+        <p:txBody>
+          <a:bodyPr/>
+          <a:lstStyle/>
+          <a:p>
+            <a:r>
+              <a:rPr lang="en-GB" dirty="0"/>
+              <a:t>I my </a:t>
+            </a:r>
+            <a:r>
+              <a:rPr lang="en-GB" dirty="0" err="1"/>
+              <a:t>zeby</a:t>
+            </a:r>
+            <a:r>
+              <a:rPr lang="en-GB" dirty="0"/>
+              <a:t> </a:t>
+            </a:r>
+            <a:r>
+              <a:rPr lang="en-GB" dirty="0" err="1"/>
+              <a:t>tak</a:t>
+            </a:r>
+            <a:r>
+              <a:rPr lang="en-GB" dirty="0"/>
+              <a:t> </a:t>
+            </a:r>
+            <a:r>
+              <a:rPr lang="en-GB" dirty="0" err="1"/>
+              <a:t>gwaltownie</a:t>
+            </a:r>
+            <a:r>
+              <a:rPr lang="en-GB" dirty="0"/>
+              <a:t> </a:t>
+            </a:r>
+            <a:r>
+              <a:rPr lang="en-GB" dirty="0" err="1"/>
+              <a:t>niezaczac</a:t>
+            </a:r>
+            <a:endParaRPr lang="pl-PL" dirty="0"/>
+          </a:p>
+        </p:txBody>
+      </p:sp>
+      <p:sp>
+        <p:nvSpPr>
+          <p:cNvPr id="4" name="Slide Number Placeholder 3"/>
+          <p:cNvSpPr>
+            <a:spLocks noGrp="1"/>
+          </p:cNvSpPr>
+          <p:nvPr>
+            <p:ph type="sldNum" sz="quarter" idx="5"/>
+          </p:nvPr>
+        </p:nvSpPr>
+        <p:spPr/>
+        <p:txBody>
+          <a:bodyPr/>
+          <a:lstStyle/>
+          <a:p>
+            <a:fld id="{55992286-4AA4-4E55-98B6-FFAF34B74A40}" type="slidenum">
+              <a:rPr lang="en-US" smtClean="0"/>
+              <a:t>3</a:t>
+            </a:fld>
+            <a:endParaRPr lang="en-US"/>
+          </a:p>
+        </p:txBody>
+      </p:sp>
+    </p:spTree>
+    <p:extLst>
+      <p:ext uri="{BB962C8B-B14F-4D97-AF65-F5344CB8AC3E}">
+        <p14:creationId xmlns:p14="http://schemas.microsoft.com/office/powerpoint/2010/main" val="1128664888"/>
+      </p:ext>
+    </p:extLst>
+  </p:cSld>
+  <p:clrMapOvr>
+    <a:masterClrMapping/>
+  </p:clrMapOvr>
+</p:notes>
+</file>
+
+<file path=ppt/notesSlides/notesSlide4.xml><?xml version="1.0" encoding="utf-8"?>
+<p:notes xmlns:a="http://schemas.openxmlformats.org/drawingml/2006/main" xmlns:r="http://schemas.openxmlformats.org/officeDocument/2006/relationships" xmlns:p="http://schemas.openxmlformats.org/presentationml/2006/main">
+  <p:cSld>
+    <p:spTree>
+      <p:nvGrpSpPr>
+        <p:cNvPr id="1" name=""/>
+        <p:cNvGrpSpPr/>
+        <p:nvPr/>
+      </p:nvGrpSpPr>
+      <p:grpSpPr>
+        <a:xfrm>
+          <a:off x="0" y="0"/>
+          <a:ext cx="0" cy="0"/>
+          <a:chOff x="0" y="0"/>
+          <a:chExt cx="0" cy="0"/>
+        </a:xfrm>
+      </p:grpSpPr>
+      <p:sp>
+        <p:nvSpPr>
+          <p:cNvPr id="2" name="Slide Image Placeholder 1"/>
+          <p:cNvSpPr>
+            <a:spLocks noGrp="1" noRot="1" noChangeAspect="1"/>
+          </p:cNvSpPr>
+          <p:nvPr>
+            <p:ph type="sldImg"/>
+          </p:nvPr>
+        </p:nvSpPr>
+        <p:spPr/>
+      </p:sp>
+      <p:sp>
+        <p:nvSpPr>
+          <p:cNvPr id="3" name="Notes Placeholder 2"/>
+          <p:cNvSpPr>
+            <a:spLocks noGrp="1"/>
+          </p:cNvSpPr>
+          <p:nvPr>
+            <p:ph type="body" idx="1"/>
+          </p:nvPr>
+        </p:nvSpPr>
+        <p:spPr/>
+        <p:txBody>
+          <a:bodyPr/>
+          <a:lstStyle/>
+          <a:p>
+            <a:r>
+              <a:rPr lang="en-GB" dirty="0" err="1"/>
+              <a:t>Według</a:t>
+            </a:r>
+            <a:r>
+              <a:rPr lang="en-GB" dirty="0"/>
+              <a:t> </a:t>
+            </a:r>
+            <a:r>
+              <a:rPr lang="en-GB" dirty="0" err="1"/>
+              <a:t>szacunkow</a:t>
+            </a:r>
+            <a:r>
+              <a:rPr lang="en-GB" dirty="0"/>
+              <a:t> </a:t>
+            </a:r>
+            <a:r>
+              <a:rPr lang="en-GB" dirty="0" err="1"/>
+              <a:t>wygenrujemy</a:t>
+            </a:r>
+            <a:r>
+              <a:rPr lang="en-GB" dirty="0"/>
+              <a:t> 40 zetta</a:t>
+            </a:r>
+          </a:p>
+          <a:p>
+            <a:r>
+              <a:rPr lang="en-GB" dirty="0" err="1"/>
+              <a:t>Czy</a:t>
+            </a:r>
+            <a:r>
+              <a:rPr lang="en-GB" dirty="0"/>
+              <a:t> to </a:t>
+            </a:r>
+            <a:r>
+              <a:rPr lang="en-GB" dirty="0" err="1"/>
+              <a:t>duzo</a:t>
+            </a:r>
+            <a:r>
+              <a:rPr lang="en-GB" dirty="0"/>
+              <a:t> </a:t>
+            </a:r>
+            <a:r>
+              <a:rPr lang="en-GB" dirty="0" err="1"/>
+              <a:t>czy</a:t>
+            </a:r>
+            <a:r>
+              <a:rPr lang="en-GB" dirty="0"/>
+              <a:t> </a:t>
+            </a:r>
+            <a:r>
+              <a:rPr lang="en-GB" dirty="0" err="1"/>
+              <a:t>malo</a:t>
+            </a:r>
+            <a:r>
+              <a:rPr lang="en-GB" dirty="0"/>
+              <a:t> –</a:t>
+            </a:r>
+            <a:r>
+              <a:rPr lang="en-GB" dirty="0" err="1"/>
+              <a:t>posluzymy</a:t>
+            </a:r>
+            <a:r>
+              <a:rPr lang="en-GB" dirty="0"/>
+              <a:t> </a:t>
+            </a:r>
+            <a:r>
+              <a:rPr lang="en-GB" dirty="0" err="1"/>
+              <a:t>sie</a:t>
+            </a:r>
+            <a:r>
+              <a:rPr lang="en-GB" dirty="0"/>
+              <a:t> </a:t>
+            </a:r>
+            <a:r>
+              <a:rPr lang="en-GB" dirty="0" err="1"/>
+              <a:t>porownaniem</a:t>
+            </a:r>
+            <a:r>
+              <a:rPr lang="en-GB" dirty="0"/>
+              <a:t> </a:t>
+            </a:r>
+            <a:r>
+              <a:rPr lang="en-GB" dirty="0" err="1"/>
+              <a:t>ktore</a:t>
+            </a:r>
+            <a:r>
+              <a:rPr lang="en-GB" dirty="0"/>
+              <a:t> </a:t>
+            </a:r>
+            <a:r>
+              <a:rPr lang="en-GB" dirty="0" err="1"/>
+              <a:t>przedstawil</a:t>
+            </a:r>
+            <a:r>
+              <a:rPr lang="en-GB" dirty="0"/>
+              <a:t> Microsoft </a:t>
+            </a:r>
+          </a:p>
+          <a:p>
+            <a:r>
+              <a:rPr lang="en-GB" dirty="0"/>
+              <a:t>Ale big data to </a:t>
+            </a:r>
+            <a:r>
+              <a:rPr lang="en-GB" dirty="0" err="1"/>
+              <a:t>nie</a:t>
+            </a:r>
+            <a:r>
+              <a:rPr lang="en-GB" dirty="0"/>
+              <a:t> </a:t>
+            </a:r>
+            <a:r>
+              <a:rPr lang="en-GB" dirty="0" err="1"/>
+              <a:t>tylko</a:t>
+            </a:r>
+            <a:r>
+              <a:rPr lang="en-GB" dirty="0"/>
+              <a:t> </a:t>
+            </a:r>
+            <a:r>
+              <a:rPr lang="en-GB" dirty="0" err="1"/>
+              <a:t>rozmiar</a:t>
+            </a:r>
+            <a:endParaRPr lang="en-GB" dirty="0"/>
+          </a:p>
+          <a:p>
+            <a:r>
+              <a:rPr lang="en-GB" dirty="0" err="1"/>
+              <a:t>Podstawowa</a:t>
+            </a:r>
+            <a:r>
+              <a:rPr lang="en-GB" dirty="0"/>
+              <a:t> </a:t>
+            </a:r>
+            <a:r>
+              <a:rPr lang="en-GB" dirty="0" err="1"/>
+              <a:t>definicja</a:t>
+            </a:r>
+            <a:r>
+              <a:rPr lang="en-GB" dirty="0"/>
+              <a:t> Big data to 3V</a:t>
+            </a:r>
+          </a:p>
+          <a:p>
+            <a:r>
+              <a:rPr lang="en-GB" dirty="0"/>
+              <a:t>Data </a:t>
+            </a:r>
+            <a:r>
+              <a:rPr lang="en-GB" dirty="0" err="1"/>
+              <a:t>Valume</a:t>
+            </a:r>
+            <a:r>
+              <a:rPr lang="en-GB" dirty="0"/>
+              <a:t>, Data Variety –</a:t>
+            </a:r>
+            <a:r>
+              <a:rPr lang="en-GB" dirty="0" err="1"/>
+              <a:t>rozne</a:t>
+            </a:r>
+            <a:r>
+              <a:rPr lang="en-GB" dirty="0"/>
+              <a:t> format </a:t>
+            </a:r>
+            <a:r>
+              <a:rPr lang="en-GB" dirty="0" err="1"/>
+              <a:t>danych</a:t>
+            </a:r>
+            <a:r>
+              <a:rPr lang="en-GB" dirty="0"/>
+              <a:t> </a:t>
+            </a:r>
+          </a:p>
+          <a:p>
+            <a:r>
+              <a:rPr lang="en-GB" dirty="0" err="1"/>
+              <a:t>Oraz</a:t>
+            </a:r>
+            <a:r>
+              <a:rPr lang="en-GB" dirty="0"/>
+              <a:t> </a:t>
+            </a:r>
+            <a:r>
+              <a:rPr lang="en-GB" dirty="0" err="1"/>
+              <a:t>szybkosc</a:t>
+            </a:r>
+            <a:r>
+              <a:rPr lang="en-GB" dirty="0"/>
+              <a:t> </a:t>
+            </a:r>
+            <a:r>
+              <a:rPr lang="en-GB" dirty="0" err="1"/>
+              <a:t>przyrastanie</a:t>
+            </a:r>
+            <a:r>
+              <a:rPr lang="en-GB" dirty="0"/>
+              <a:t> </a:t>
+            </a:r>
+            <a:r>
+              <a:rPr lang="en-GB" dirty="0" err="1"/>
+              <a:t>danych</a:t>
+            </a:r>
+            <a:r>
+              <a:rPr lang="en-GB" dirty="0"/>
+              <a:t> –</a:t>
+            </a:r>
+            <a:r>
+              <a:rPr lang="en-GB" dirty="0" err="1"/>
+              <a:t>ja</a:t>
+            </a:r>
+            <a:r>
+              <a:rPr lang="en-GB" dirty="0"/>
+              <a:t> to </a:t>
+            </a:r>
+            <a:r>
+              <a:rPr lang="en-GB" dirty="0" err="1"/>
+              <a:t>rowniez</a:t>
+            </a:r>
+            <a:r>
+              <a:rPr lang="en-GB" dirty="0"/>
+              <a:t> </a:t>
+            </a:r>
+            <a:r>
+              <a:rPr lang="en-GB" dirty="0" err="1"/>
+              <a:t>rozumiem</a:t>
+            </a:r>
+            <a:r>
+              <a:rPr lang="en-GB" dirty="0"/>
+              <a:t> </a:t>
+            </a:r>
+            <a:r>
+              <a:rPr lang="en-GB" dirty="0" err="1"/>
+              <a:t>jako</a:t>
+            </a:r>
+            <a:r>
+              <a:rPr lang="en-GB" dirty="0"/>
+              <a:t> </a:t>
+            </a:r>
+            <a:r>
+              <a:rPr lang="en-GB" dirty="0" err="1"/>
+              <a:t>sposob</a:t>
+            </a:r>
+            <a:r>
+              <a:rPr lang="en-GB" dirty="0"/>
+              <a:t> </a:t>
+            </a:r>
+            <a:r>
+              <a:rPr lang="en-GB" dirty="0" err="1"/>
+              <a:t>przetwarzania</a:t>
+            </a:r>
+            <a:r>
+              <a:rPr lang="en-GB" dirty="0"/>
+              <a:t> </a:t>
+            </a:r>
+          </a:p>
+          <a:p>
+            <a:r>
+              <a:rPr lang="en-GB" dirty="0" err="1"/>
+              <a:t>Dzis</a:t>
+            </a:r>
+            <a:r>
+              <a:rPr lang="en-GB" dirty="0"/>
+              <a:t> </a:t>
+            </a:r>
+            <a:r>
+              <a:rPr lang="en-GB" dirty="0" err="1"/>
+              <a:t>skupimy</a:t>
+            </a:r>
+            <a:r>
+              <a:rPr lang="en-GB" dirty="0"/>
+              <a:t> </a:t>
+            </a:r>
+            <a:r>
+              <a:rPr lang="en-GB" dirty="0" err="1"/>
+              <a:t>sie</a:t>
+            </a:r>
+            <a:r>
+              <a:rPr lang="en-GB" dirty="0"/>
+              <a:t> </a:t>
+            </a:r>
+            <a:r>
+              <a:rPr lang="en-GB" dirty="0" err="1"/>
+              <a:t>na</a:t>
+            </a:r>
+            <a:r>
+              <a:rPr lang="en-GB" dirty="0"/>
+              <a:t> </a:t>
+            </a:r>
+            <a:r>
+              <a:rPr lang="en-GB" dirty="0" err="1"/>
+              <a:t>rozwiazaniu</a:t>
+            </a:r>
+            <a:r>
+              <a:rPr lang="en-GB" dirty="0"/>
+              <a:t> </a:t>
+            </a:r>
+            <a:r>
+              <a:rPr lang="en-GB" dirty="0" err="1"/>
+              <a:t>ktore</a:t>
+            </a:r>
+            <a:r>
+              <a:rPr lang="en-GB" dirty="0"/>
+              <a:t> </a:t>
+            </a:r>
+            <a:r>
+              <a:rPr lang="en-GB" dirty="0" err="1"/>
+              <a:t>umozliwia</a:t>
+            </a:r>
+            <a:r>
+              <a:rPr lang="en-GB" dirty="0"/>
+              <a:t> </a:t>
+            </a:r>
+            <a:r>
+              <a:rPr lang="en-GB" dirty="0" err="1"/>
+              <a:t>przetwarzenie</a:t>
+            </a:r>
+            <a:r>
+              <a:rPr lang="en-GB" dirty="0"/>
+              <a:t> </a:t>
+            </a:r>
+            <a:r>
+              <a:rPr lang="en-GB" dirty="0" err="1"/>
+              <a:t>danych</a:t>
+            </a:r>
+            <a:r>
+              <a:rPr lang="en-GB" dirty="0"/>
+              <a:t> w </a:t>
+            </a:r>
+            <a:r>
+              <a:rPr lang="en-GB" dirty="0" err="1"/>
+              <a:t>trybie</a:t>
+            </a:r>
+            <a:r>
+              <a:rPr lang="en-GB" dirty="0"/>
+              <a:t> </a:t>
+            </a:r>
+            <a:r>
+              <a:rPr lang="en-GB" dirty="0" err="1"/>
+              <a:t>batchowym</a:t>
+            </a:r>
+            <a:endParaRPr lang="pl-PL" dirty="0"/>
+          </a:p>
+        </p:txBody>
+      </p:sp>
+      <p:sp>
+        <p:nvSpPr>
+          <p:cNvPr id="4" name="Slide Number Placeholder 3"/>
+          <p:cNvSpPr>
+            <a:spLocks noGrp="1"/>
+          </p:cNvSpPr>
+          <p:nvPr>
+            <p:ph type="sldNum" sz="quarter" idx="5"/>
+          </p:nvPr>
+        </p:nvSpPr>
+        <p:spPr/>
+        <p:txBody>
+          <a:bodyPr/>
+          <a:lstStyle/>
+          <a:p>
+            <a:fld id="{55992286-4AA4-4E55-98B6-FFAF34B74A40}" type="slidenum">
+              <a:rPr lang="en-US" smtClean="0"/>
+              <a:t>4</a:t>
+            </a:fld>
+            <a:endParaRPr lang="en-US"/>
+          </a:p>
+        </p:txBody>
+      </p:sp>
+    </p:spTree>
+    <p:extLst>
+      <p:ext uri="{BB962C8B-B14F-4D97-AF65-F5344CB8AC3E}">
+        <p14:creationId xmlns:p14="http://schemas.microsoft.com/office/powerpoint/2010/main" val="39555759"/>
+      </p:ext>
+    </p:extLst>
+  </p:cSld>
+  <p:clrMapOvr>
+    <a:masterClrMapping/>
+  </p:clrMapOvr>
+</p:notes>
+</file>
+
+<file path=ppt/notesSlides/notesSlide5.xml><?xml version="1.0" encoding="utf-8"?>
+<p:notes xmlns:a="http://schemas.openxmlformats.org/drawingml/2006/main" xmlns:r="http://schemas.openxmlformats.org/officeDocument/2006/relationships" xmlns:p="http://schemas.openxmlformats.org/presentationml/2006/main">
+  <p:cSld>
+    <p:spTree>
+      <p:nvGrpSpPr>
+        <p:cNvPr id="1" name=""/>
+        <p:cNvGrpSpPr/>
+        <p:nvPr/>
+      </p:nvGrpSpPr>
+      <p:grpSpPr>
+        <a:xfrm>
+          <a:off x="0" y="0"/>
+          <a:ext cx="0" cy="0"/>
+          <a:chOff x="0" y="0"/>
+          <a:chExt cx="0" cy="0"/>
+        </a:xfrm>
+      </p:grpSpPr>
+      <p:sp>
+        <p:nvSpPr>
+          <p:cNvPr id="2" name="Slide Image Placeholder 1"/>
+          <p:cNvSpPr>
+            <a:spLocks noGrp="1" noRot="1" noChangeAspect="1"/>
+          </p:cNvSpPr>
+          <p:nvPr>
+            <p:ph type="sldImg"/>
+          </p:nvPr>
+        </p:nvSpPr>
+        <p:spPr/>
+      </p:sp>
+      <p:sp>
+        <p:nvSpPr>
+          <p:cNvPr id="3" name="Notes Placeholder 2"/>
+          <p:cNvSpPr>
+            <a:spLocks noGrp="1"/>
+          </p:cNvSpPr>
+          <p:nvPr>
+            <p:ph type="body" idx="1"/>
+          </p:nvPr>
+        </p:nvSpPr>
+        <p:spPr/>
+        <p:txBody>
+          <a:bodyPr/>
+          <a:lstStyle/>
+          <a:p>
+            <a:r>
+              <a:rPr lang="en-GB" dirty="0" err="1"/>
+              <a:t>Wiemy</a:t>
+            </a:r>
+            <a:r>
+              <a:rPr lang="en-GB" dirty="0"/>
+              <a:t> </a:t>
+            </a:r>
+            <a:r>
+              <a:rPr lang="en-GB" dirty="0" err="1"/>
+              <a:t>juz</a:t>
+            </a:r>
+            <a:r>
+              <a:rPr lang="en-GB" dirty="0"/>
+              <a:t> co Big Data – ale </a:t>
+            </a:r>
+            <a:r>
+              <a:rPr lang="en-GB" dirty="0" err="1"/>
+              <a:t>jak</a:t>
+            </a:r>
+            <a:r>
+              <a:rPr lang="en-GB" dirty="0"/>
+              <a:t> je </a:t>
+            </a:r>
+            <a:r>
+              <a:rPr lang="en-GB" dirty="0" err="1"/>
+              <a:t>przetwarzac</a:t>
+            </a:r>
+            <a:r>
+              <a:rPr lang="en-GB" dirty="0"/>
+              <a:t>?</a:t>
+            </a:r>
+            <a:endParaRPr lang="pl-PL" dirty="0"/>
+          </a:p>
+        </p:txBody>
+      </p:sp>
+      <p:sp>
+        <p:nvSpPr>
+          <p:cNvPr id="4" name="Slide Number Placeholder 3"/>
+          <p:cNvSpPr>
+            <a:spLocks noGrp="1"/>
+          </p:cNvSpPr>
+          <p:nvPr>
+            <p:ph type="sldNum" sz="quarter" idx="5"/>
+          </p:nvPr>
+        </p:nvSpPr>
+        <p:spPr/>
+        <p:txBody>
+          <a:bodyPr/>
+          <a:lstStyle/>
+          <a:p>
+            <a:fld id="{55992286-4AA4-4E55-98B6-FFAF34B74A40}" type="slidenum">
+              <a:rPr lang="en-US" smtClean="0"/>
+              <a:t>5</a:t>
+            </a:fld>
+            <a:endParaRPr lang="en-US"/>
+          </a:p>
+        </p:txBody>
+      </p:sp>
+    </p:spTree>
+    <p:extLst>
+      <p:ext uri="{BB962C8B-B14F-4D97-AF65-F5344CB8AC3E}">
+        <p14:creationId xmlns:p14="http://schemas.microsoft.com/office/powerpoint/2010/main" val="2287788525"/>
+      </p:ext>
+    </p:extLst>
+  </p:cSld>
+  <p:clrMapOvr>
+    <a:masterClrMapping/>
+  </p:clrMapOvr>
+</p:notes>
+</file>
+
+<file path=ppt/notesSlides/notesSlide6.xml><?xml version="1.0" encoding="utf-8"?>
+<p:notes xmlns:a="http://schemas.openxmlformats.org/drawingml/2006/main" xmlns:r="http://schemas.openxmlformats.org/officeDocument/2006/relationships" xmlns:p="http://schemas.openxmlformats.org/presentationml/2006/main">
+  <p:cSld>
+    <p:spTree>
+      <p:nvGrpSpPr>
+        <p:cNvPr id="1" name=""/>
+        <p:cNvGrpSpPr/>
+        <p:nvPr/>
+      </p:nvGrpSpPr>
+      <p:grpSpPr>
+        <a:xfrm>
+          <a:off x="0" y="0"/>
+          <a:ext cx="0" cy="0"/>
+          <a:chOff x="0" y="0"/>
+          <a:chExt cx="0" cy="0"/>
+        </a:xfrm>
+      </p:grpSpPr>
+      <p:sp>
+        <p:nvSpPr>
+          <p:cNvPr id="2" name="Slide Image Placeholder 1"/>
+          <p:cNvSpPr>
+            <a:spLocks noGrp="1" noRot="1" noChangeAspect="1"/>
+          </p:cNvSpPr>
+          <p:nvPr>
+            <p:ph type="sldImg"/>
+          </p:nvPr>
+        </p:nvSpPr>
+        <p:spPr/>
+      </p:sp>
+      <p:sp>
+        <p:nvSpPr>
+          <p:cNvPr id="3" name="Notes Placeholder 2"/>
+          <p:cNvSpPr>
+            <a:spLocks noGrp="1"/>
+          </p:cNvSpPr>
+          <p:nvPr>
+            <p:ph type="body" idx="1"/>
+          </p:nvPr>
+        </p:nvSpPr>
+        <p:spPr/>
+        <p:txBody>
+          <a:bodyPr/>
+          <a:lstStyle/>
+          <a:p>
+            <a:r>
+              <a:rPr lang="en-GB" dirty="0" err="1"/>
+              <a:t>Jedna</a:t>
+            </a:r>
+            <a:r>
+              <a:rPr lang="en-GB" dirty="0"/>
+              <a:t> z </a:t>
+            </a:r>
+            <a:r>
+              <a:rPr lang="en-GB" dirty="0" err="1"/>
+              <a:t>zasadniczych</a:t>
+            </a:r>
+            <a:r>
+              <a:rPr lang="en-GB" dirty="0"/>
+              <a:t> </a:t>
+            </a:r>
+            <a:r>
+              <a:rPr lang="en-GB" dirty="0" err="1"/>
+              <a:t>roznic</a:t>
+            </a:r>
+            <a:r>
+              <a:rPr lang="en-GB" dirty="0"/>
+              <a:t> </a:t>
+            </a:r>
+            <a:r>
+              <a:rPr lang="en-GB" dirty="0" err="1"/>
+              <a:t>jesli</a:t>
+            </a:r>
+            <a:r>
+              <a:rPr lang="en-GB" dirty="0"/>
+              <a:t> </a:t>
+            </a:r>
+            <a:r>
+              <a:rPr lang="en-GB" dirty="0" err="1"/>
+              <a:t>chodzi</a:t>
+            </a:r>
+            <a:r>
+              <a:rPr lang="en-GB" dirty="0"/>
+              <a:t> o </a:t>
+            </a:r>
+            <a:r>
+              <a:rPr lang="en-GB" dirty="0" err="1"/>
+              <a:t>przetwarzanie</a:t>
+            </a:r>
+            <a:r>
+              <a:rPr lang="en-GB" dirty="0"/>
+              <a:t> Big Data jest to, ze </a:t>
+            </a:r>
+            <a:r>
+              <a:rPr lang="en-GB" dirty="0" err="1"/>
+              <a:t>dane</a:t>
+            </a:r>
+            <a:r>
+              <a:rPr lang="en-GB" dirty="0"/>
+              <a:t> </a:t>
+            </a:r>
+            <a:r>
+              <a:rPr lang="en-GB" dirty="0" err="1"/>
+              <a:t>mamy</a:t>
+            </a:r>
+            <a:r>
+              <a:rPr lang="en-GB" dirty="0"/>
+              <a:t> w </a:t>
+            </a:r>
+            <a:r>
+              <a:rPr lang="en-GB" dirty="0" err="1"/>
+              <a:t>surowym</a:t>
+            </a:r>
+            <a:r>
+              <a:rPr lang="en-GB" dirty="0"/>
+              <a:t> </a:t>
+            </a:r>
+            <a:r>
+              <a:rPr lang="en-GB" dirty="0" err="1"/>
+              <a:t>formacie</a:t>
+            </a:r>
+            <a:r>
+              <a:rPr lang="en-GB" dirty="0"/>
+              <a:t> a schemata </a:t>
+            </a:r>
+            <a:r>
+              <a:rPr lang="en-GB" dirty="0" err="1"/>
+              <a:t>nakladamy</a:t>
+            </a:r>
+            <a:r>
+              <a:rPr lang="en-GB" dirty="0"/>
+              <a:t> w </a:t>
+            </a:r>
+            <a:r>
+              <a:rPr lang="en-GB" dirty="0" err="1"/>
+              <a:t>momencie</a:t>
+            </a:r>
+            <a:r>
+              <a:rPr lang="en-GB" dirty="0"/>
+              <a:t> </a:t>
+            </a:r>
+            <a:r>
+              <a:rPr lang="en-GB" dirty="0" err="1"/>
+              <a:t>przetwarzania</a:t>
+            </a:r>
+            <a:r>
+              <a:rPr lang="en-GB" dirty="0"/>
+              <a:t> </a:t>
+            </a:r>
+          </a:p>
+          <a:p>
+            <a:r>
+              <a:rPr lang="en-GB" dirty="0"/>
+              <a:t>W RBMS/DW </a:t>
+            </a:r>
+            <a:r>
+              <a:rPr lang="en-GB" dirty="0" err="1"/>
+              <a:t>najpierw</a:t>
+            </a:r>
+            <a:r>
+              <a:rPr lang="en-GB" dirty="0"/>
+              <a:t> </a:t>
+            </a:r>
+            <a:r>
+              <a:rPr lang="en-GB" dirty="0" err="1"/>
+              <a:t>tworzymy</a:t>
+            </a:r>
+            <a:r>
+              <a:rPr lang="en-GB" dirty="0"/>
+              <a:t> </a:t>
+            </a:r>
+            <a:r>
+              <a:rPr lang="en-GB" dirty="0" err="1"/>
+              <a:t>schematy</a:t>
+            </a:r>
+            <a:r>
+              <a:rPr lang="en-GB" dirty="0"/>
+              <a:t> </a:t>
+            </a:r>
+            <a:r>
+              <a:rPr lang="en-GB" dirty="0" err="1"/>
+              <a:t>potem</a:t>
+            </a:r>
+            <a:r>
+              <a:rPr lang="en-GB" dirty="0"/>
+              <a:t> </a:t>
+            </a:r>
+            <a:r>
+              <a:rPr lang="en-GB" dirty="0" err="1"/>
+              <a:t>skomplikowane</a:t>
+            </a:r>
+            <a:r>
+              <a:rPr lang="en-GB" dirty="0"/>
+              <a:t> </a:t>
+            </a:r>
+            <a:r>
+              <a:rPr lang="en-GB" dirty="0" err="1"/>
+              <a:t>procesy</a:t>
+            </a:r>
+            <a:r>
+              <a:rPr lang="en-GB" dirty="0"/>
+              <a:t> ETL w </a:t>
+            </a:r>
+            <a:r>
+              <a:rPr lang="en-GB" dirty="0" err="1"/>
+              <a:t>przypadku</a:t>
+            </a:r>
+            <a:r>
+              <a:rPr lang="en-GB" dirty="0"/>
+              <a:t> DW </a:t>
+            </a:r>
+            <a:r>
+              <a:rPr lang="en-GB" dirty="0" err="1"/>
+              <a:t>tak</a:t>
+            </a:r>
+            <a:r>
+              <a:rPr lang="en-GB" dirty="0"/>
+              <a:t> aby </a:t>
+            </a:r>
+            <a:r>
+              <a:rPr lang="en-GB" dirty="0" err="1"/>
+              <a:t>dane</a:t>
+            </a:r>
+            <a:r>
+              <a:rPr lang="en-GB" dirty="0"/>
+              <a:t> </a:t>
+            </a:r>
+            <a:r>
+              <a:rPr lang="en-GB" dirty="0" err="1"/>
+              <a:t>dostosowac</a:t>
+            </a:r>
+            <a:r>
+              <a:rPr lang="en-GB" dirty="0"/>
+              <a:t> do </a:t>
+            </a:r>
+            <a:r>
+              <a:rPr lang="en-GB" dirty="0" err="1"/>
+              <a:t>celowych</a:t>
+            </a:r>
+            <a:r>
+              <a:rPr lang="en-GB" dirty="0"/>
+              <a:t> </a:t>
+            </a:r>
+            <a:r>
+              <a:rPr lang="en-GB" dirty="0" err="1"/>
+              <a:t>schematow</a:t>
+            </a:r>
+            <a:r>
+              <a:rPr lang="en-GB" dirty="0"/>
+              <a:t> I </a:t>
+            </a:r>
+            <a:r>
+              <a:rPr lang="en-GB" dirty="0" err="1"/>
+              <a:t>potem</a:t>
+            </a:r>
+            <a:r>
+              <a:rPr lang="en-GB" dirty="0"/>
+              <a:t> za </a:t>
+            </a:r>
+            <a:r>
+              <a:rPr lang="en-GB" dirty="0" err="1"/>
+              <a:t>pomoca</a:t>
+            </a:r>
+            <a:r>
+              <a:rPr lang="en-GB" dirty="0"/>
+              <a:t> SQL</a:t>
+            </a:r>
+          </a:p>
+          <a:p>
+            <a:r>
+              <a:rPr lang="en-GB" dirty="0" err="1"/>
+              <a:t>Mozemy</a:t>
+            </a:r>
+            <a:r>
+              <a:rPr lang="en-GB" dirty="0"/>
+              <a:t> </a:t>
+            </a:r>
+            <a:r>
+              <a:rPr lang="en-GB" dirty="0" err="1"/>
+              <a:t>analizowac</a:t>
+            </a:r>
+            <a:r>
+              <a:rPr lang="en-GB" dirty="0"/>
+              <a:t> </a:t>
+            </a:r>
+            <a:r>
+              <a:rPr lang="en-GB" dirty="0" err="1"/>
+              <a:t>nasze</a:t>
+            </a:r>
+            <a:r>
+              <a:rPr lang="en-GB" dirty="0"/>
+              <a:t> </a:t>
+            </a:r>
+            <a:r>
+              <a:rPr lang="en-GB" dirty="0" err="1"/>
+              <a:t>dane</a:t>
+            </a:r>
+            <a:endParaRPr lang="en-GB" dirty="0"/>
+          </a:p>
+          <a:p>
+            <a:endParaRPr lang="pl-PL" dirty="0"/>
+          </a:p>
+        </p:txBody>
+      </p:sp>
+      <p:sp>
+        <p:nvSpPr>
+          <p:cNvPr id="4" name="Slide Number Placeholder 3"/>
+          <p:cNvSpPr>
+            <a:spLocks noGrp="1"/>
+          </p:cNvSpPr>
+          <p:nvPr>
+            <p:ph type="sldNum" sz="quarter" idx="5"/>
+          </p:nvPr>
+        </p:nvSpPr>
+        <p:spPr/>
+        <p:txBody>
+          <a:bodyPr/>
+          <a:lstStyle/>
+          <a:p>
+            <a:fld id="{55992286-4AA4-4E55-98B6-FFAF34B74A40}" type="slidenum">
+              <a:rPr lang="en-US" smtClean="0"/>
+              <a:t>6</a:t>
+            </a:fld>
+            <a:endParaRPr lang="en-US"/>
+          </a:p>
+        </p:txBody>
+      </p:sp>
+    </p:spTree>
+    <p:extLst>
+      <p:ext uri="{BB962C8B-B14F-4D97-AF65-F5344CB8AC3E}">
+        <p14:creationId xmlns:p14="http://schemas.microsoft.com/office/powerpoint/2010/main" val="2228953573"/>
+      </p:ext>
+    </p:extLst>
+  </p:cSld>
+  <p:clrMapOvr>
+    <a:masterClrMapping/>
+  </p:clrMapOvr>
+</p:notes>
+</file>
+
+<file path=ppt/notesSlides/notesSlide7.xml><?xml version="1.0" encoding="utf-8"?>
+<p:notes xmlns:a="http://schemas.openxmlformats.org/drawingml/2006/main" xmlns:r="http://schemas.openxmlformats.org/officeDocument/2006/relationships" xmlns:p="http://schemas.openxmlformats.org/presentationml/2006/main">
+  <p:cSld>
+    <p:spTree>
+      <p:nvGrpSpPr>
+        <p:cNvPr id="1" name=""/>
+        <p:cNvGrpSpPr/>
+        <p:nvPr/>
+      </p:nvGrpSpPr>
+      <p:grpSpPr>
+        <a:xfrm>
+          <a:off x="0" y="0"/>
+          <a:ext cx="0" cy="0"/>
+          <a:chOff x="0" y="0"/>
+          <a:chExt cx="0" cy="0"/>
+        </a:xfrm>
+      </p:grpSpPr>
+      <p:sp>
+        <p:nvSpPr>
+          <p:cNvPr id="2" name="Slide Image Placeholder 1"/>
+          <p:cNvSpPr>
+            <a:spLocks noGrp="1" noRot="1" noChangeAspect="1"/>
+          </p:cNvSpPr>
+          <p:nvPr>
+            <p:ph type="sldImg"/>
+          </p:nvPr>
+        </p:nvSpPr>
+        <p:spPr/>
+      </p:sp>
+      <p:sp>
+        <p:nvSpPr>
+          <p:cNvPr id="3" name="Notes Placeholder 2"/>
+          <p:cNvSpPr>
+            <a:spLocks noGrp="1"/>
+          </p:cNvSpPr>
+          <p:nvPr>
+            <p:ph type="body" idx="1"/>
+          </p:nvPr>
+        </p:nvSpPr>
+        <p:spPr/>
+        <p:txBody>
+          <a:bodyPr/>
+          <a:lstStyle/>
+          <a:p>
+            <a:r>
+              <a:rPr lang="en-GB" dirty="0"/>
+              <a:t>Big Data </a:t>
+            </a:r>
+            <a:r>
+              <a:rPr lang="en-GB" dirty="0" err="1"/>
+              <a:t>jak</a:t>
+            </a:r>
+            <a:r>
+              <a:rPr lang="en-GB" dirty="0"/>
+              <a:t> </a:t>
+            </a:r>
+            <a:r>
+              <a:rPr lang="en-GB" dirty="0" err="1"/>
+              <a:t>sama</a:t>
+            </a:r>
+            <a:r>
+              <a:rPr lang="en-GB" dirty="0"/>
+              <a:t> </a:t>
+            </a:r>
+            <a:r>
+              <a:rPr lang="en-GB" dirty="0" err="1"/>
+              <a:t>nazwa</a:t>
+            </a:r>
+            <a:r>
+              <a:rPr lang="en-GB" dirty="0"/>
+              <a:t> </a:t>
+            </a:r>
+            <a:r>
+              <a:rPr lang="en-GB" dirty="0" err="1"/>
+              <a:t>wskazuje</a:t>
+            </a:r>
+            <a:r>
+              <a:rPr lang="en-GB" dirty="0"/>
+              <a:t> to </a:t>
+            </a:r>
+            <a:r>
+              <a:rPr lang="en-GB" dirty="0" err="1"/>
+              <a:t>chyba</a:t>
+            </a:r>
+            <a:r>
+              <a:rPr lang="en-GB" dirty="0"/>
+              <a:t> </a:t>
+            </a:r>
+            <a:r>
+              <a:rPr lang="en-GB" dirty="0" err="1"/>
+              <a:t>duzo</a:t>
+            </a:r>
+            <a:r>
+              <a:rPr lang="en-GB" dirty="0"/>
+              <a:t> </a:t>
+            </a:r>
+            <a:r>
+              <a:rPr lang="en-GB" dirty="0" err="1"/>
+              <a:t>danych</a:t>
+            </a:r>
+            <a:r>
+              <a:rPr lang="en-GB" dirty="0"/>
+              <a:t> a </a:t>
+            </a:r>
+            <a:r>
+              <a:rPr lang="en-GB" dirty="0" err="1"/>
+              <a:t>wiec</a:t>
+            </a:r>
+            <a:r>
+              <a:rPr lang="en-GB" dirty="0"/>
+              <a:t> </a:t>
+            </a:r>
+            <a:r>
+              <a:rPr lang="en-GB" dirty="0" err="1"/>
+              <a:t>prawdopodobnie</a:t>
+            </a:r>
+            <a:r>
+              <a:rPr lang="en-GB" dirty="0"/>
+              <a:t> </a:t>
+            </a:r>
+            <a:r>
+              <a:rPr lang="en-GB" dirty="0" err="1"/>
+              <a:t>bedziemy</a:t>
+            </a:r>
+            <a:r>
+              <a:rPr lang="en-GB" dirty="0"/>
+              <a:t> </a:t>
+            </a:r>
+            <a:r>
+              <a:rPr lang="en-GB" dirty="0" err="1"/>
+              <a:t>potrzebowac</a:t>
+            </a:r>
+            <a:r>
+              <a:rPr lang="en-GB" dirty="0"/>
+              <a:t> </a:t>
+            </a:r>
+            <a:r>
+              <a:rPr lang="en-GB" dirty="0" err="1"/>
+              <a:t>duzo</a:t>
+            </a:r>
+            <a:r>
+              <a:rPr lang="en-GB" dirty="0"/>
+              <a:t> </a:t>
+            </a:r>
+            <a:r>
+              <a:rPr lang="en-GB" dirty="0" err="1"/>
+              <a:t>mocy</a:t>
+            </a:r>
+            <a:r>
+              <a:rPr lang="en-GB" dirty="0"/>
+              <a:t> </a:t>
+            </a:r>
+            <a:r>
+              <a:rPr lang="en-GB" dirty="0" err="1"/>
+              <a:t>obliczeniowej</a:t>
+            </a:r>
+            <a:r>
+              <a:rPr lang="en-GB" dirty="0"/>
+              <a:t>, a ta </a:t>
+            </a:r>
+            <a:r>
+              <a:rPr lang="en-GB" dirty="0" err="1"/>
+              <a:t>znajdzemy</a:t>
+            </a:r>
+            <a:r>
+              <a:rPr lang="en-GB" dirty="0"/>
+              <a:t> w </a:t>
+            </a:r>
+            <a:r>
+              <a:rPr lang="en-GB" dirty="0" err="1"/>
+              <a:t>chmurze</a:t>
+            </a:r>
+            <a:r>
+              <a:rPr lang="en-GB" dirty="0"/>
+              <a:t>.</a:t>
+            </a:r>
+          </a:p>
+          <a:p>
+            <a:r>
+              <a:rPr lang="en-GB" dirty="0" err="1"/>
+              <a:t>Zobaczymy</a:t>
+            </a:r>
+            <a:r>
+              <a:rPr lang="en-GB" dirty="0"/>
+              <a:t> </a:t>
+            </a:r>
+            <a:r>
+              <a:rPr lang="en-GB" dirty="0" err="1"/>
+              <a:t>zatem</a:t>
+            </a:r>
+            <a:r>
+              <a:rPr lang="en-GB" dirty="0"/>
+              <a:t> co </a:t>
+            </a:r>
+            <a:r>
+              <a:rPr lang="en-GB" dirty="0" err="1"/>
+              <a:t>mamy</a:t>
+            </a:r>
+            <a:r>
+              <a:rPr lang="en-GB" dirty="0"/>
+              <a:t> w </a:t>
+            </a:r>
+            <a:r>
+              <a:rPr lang="en-GB" dirty="0" err="1"/>
+              <a:t>chmurze</a:t>
+            </a:r>
+            <a:r>
+              <a:rPr lang="en-GB" dirty="0"/>
+              <a:t> Azure do </a:t>
+            </a:r>
+            <a:r>
+              <a:rPr lang="en-GB" dirty="0" err="1"/>
+              <a:t>przetwarzania</a:t>
+            </a:r>
+            <a:r>
+              <a:rPr lang="en-GB" dirty="0"/>
+              <a:t> </a:t>
+            </a:r>
+            <a:r>
+              <a:rPr lang="en-GB" dirty="0" err="1"/>
+              <a:t>danych</a:t>
+            </a:r>
+            <a:endParaRPr lang="en-GB" dirty="0"/>
+          </a:p>
+          <a:p>
+            <a:r>
+              <a:rPr lang="en-GB" dirty="0" err="1"/>
+              <a:t>Jesli</a:t>
+            </a:r>
+            <a:r>
+              <a:rPr lang="en-GB" dirty="0"/>
+              <a:t>  </a:t>
+            </a:r>
+            <a:r>
+              <a:rPr lang="en-GB" dirty="0" err="1"/>
+              <a:t>mowimy</a:t>
+            </a:r>
+            <a:r>
+              <a:rPr lang="en-GB" dirty="0"/>
+              <a:t> o </a:t>
+            </a:r>
+            <a:r>
+              <a:rPr lang="en-GB" dirty="0" err="1"/>
+              <a:t>przetarzaniu</a:t>
+            </a:r>
+            <a:r>
+              <a:rPr lang="en-GB" dirty="0"/>
+              <a:t> </a:t>
+            </a:r>
+            <a:r>
+              <a:rPr lang="en-GB" dirty="0" err="1"/>
+              <a:t>danych</a:t>
+            </a:r>
+            <a:r>
+              <a:rPr lang="en-GB" dirty="0"/>
+              <a:t> w </a:t>
+            </a:r>
+            <a:r>
+              <a:rPr lang="en-GB" dirty="0" err="1"/>
+              <a:t>chmurze</a:t>
+            </a:r>
+            <a:r>
+              <a:rPr lang="en-GB" dirty="0"/>
+              <a:t> Azure to </a:t>
+            </a:r>
+            <a:r>
+              <a:rPr lang="en-GB" dirty="0" err="1"/>
+              <a:t>zawsze</a:t>
+            </a:r>
+            <a:r>
+              <a:rPr lang="en-GB" dirty="0"/>
+              <a:t> </a:t>
+            </a:r>
+            <a:r>
+              <a:rPr lang="en-GB" dirty="0" err="1"/>
+              <a:t>bedziemy</a:t>
+            </a:r>
+            <a:r>
+              <a:rPr lang="en-GB" dirty="0"/>
+              <a:t> </a:t>
+            </a:r>
+            <a:r>
+              <a:rPr lang="en-GB" dirty="0" err="1"/>
+              <a:t>musieli</a:t>
+            </a:r>
+            <a:r>
+              <a:rPr lang="en-GB" dirty="0"/>
+              <a:t> </a:t>
+            </a:r>
+            <a:r>
+              <a:rPr lang="en-GB" dirty="0" err="1"/>
+              <a:t>powiedziec</a:t>
+            </a:r>
+            <a:r>
+              <a:rPr lang="en-GB" dirty="0"/>
+              <a:t> o Storage </a:t>
+            </a:r>
+            <a:r>
+              <a:rPr lang="en-GB" dirty="0" err="1"/>
+              <a:t>oraz</a:t>
+            </a:r>
+            <a:r>
+              <a:rPr lang="en-GB" dirty="0"/>
+              <a:t> </a:t>
+            </a:r>
+            <a:r>
+              <a:rPr lang="en-GB" dirty="0" err="1"/>
+              <a:t>uslugach</a:t>
+            </a:r>
+            <a:r>
+              <a:rPr lang="en-GB" dirty="0"/>
+              <a:t> </a:t>
+            </a:r>
+            <a:r>
+              <a:rPr lang="en-GB" dirty="0" err="1"/>
+              <a:t>analycznych</a:t>
+            </a:r>
+            <a:r>
+              <a:rPr lang="en-GB" dirty="0"/>
+              <a:t> I </a:t>
+            </a:r>
+            <a:r>
+              <a:rPr lang="en-GB" dirty="0" err="1"/>
+              <a:t>zwykle</a:t>
+            </a:r>
+            <a:r>
+              <a:rPr lang="en-GB" dirty="0"/>
+              <a:t> </a:t>
+            </a:r>
+            <a:r>
+              <a:rPr lang="en-GB" dirty="0" err="1"/>
+              <a:t>te</a:t>
+            </a:r>
+            <a:r>
+              <a:rPr lang="en-GB" dirty="0"/>
+              <a:t> </a:t>
+            </a:r>
+            <a:r>
+              <a:rPr lang="en-GB" dirty="0" err="1"/>
+              <a:t>dwie</a:t>
+            </a:r>
+            <a:r>
+              <a:rPr lang="en-GB" dirty="0"/>
+              <a:t> </a:t>
+            </a:r>
+            <a:r>
+              <a:rPr lang="en-GB" dirty="0" err="1"/>
+              <a:t>usulugi</a:t>
+            </a:r>
+            <a:r>
+              <a:rPr lang="en-GB" dirty="0"/>
+              <a:t> </a:t>
+            </a:r>
+            <a:r>
+              <a:rPr lang="en-GB" dirty="0" err="1"/>
+              <a:t>sa</a:t>
+            </a:r>
+            <a:r>
+              <a:rPr lang="en-GB" dirty="0"/>
+              <a:t> ze soba </a:t>
+            </a:r>
+            <a:r>
+              <a:rPr lang="en-GB" dirty="0" err="1"/>
+              <a:t>rozdzielone</a:t>
+            </a:r>
+            <a:endParaRPr lang="en-GB" dirty="0"/>
+          </a:p>
+          <a:p>
+            <a:r>
+              <a:rPr lang="en-GB" dirty="0" err="1"/>
+              <a:t>Jesli</a:t>
+            </a:r>
+            <a:r>
+              <a:rPr lang="en-GB" dirty="0"/>
+              <a:t> </a:t>
+            </a:r>
+            <a:r>
+              <a:rPr lang="en-GB" dirty="0" err="1"/>
+              <a:t>chodzi</a:t>
+            </a:r>
+            <a:r>
+              <a:rPr lang="en-GB" dirty="0"/>
+              <a:t> o Storage to </a:t>
+            </a:r>
+            <a:r>
+              <a:rPr lang="en-GB" dirty="0" err="1"/>
+              <a:t>dla</a:t>
+            </a:r>
+            <a:r>
+              <a:rPr lang="en-GB" dirty="0"/>
+              <a:t> Big Data </a:t>
+            </a:r>
+            <a:r>
+              <a:rPr lang="en-GB" dirty="0" err="1"/>
+              <a:t>na</a:t>
+            </a:r>
+            <a:r>
+              <a:rPr lang="en-GB" dirty="0"/>
+              <a:t> Azure </a:t>
+            </a:r>
+            <a:r>
+              <a:rPr lang="en-GB" dirty="0" err="1"/>
+              <a:t>Mamy</a:t>
+            </a:r>
+            <a:r>
+              <a:rPr lang="en-GB" dirty="0"/>
+              <a:t> ADLS (Blob) ADLS Gen 2</a:t>
+            </a:r>
+          </a:p>
+          <a:p>
+            <a:r>
+              <a:rPr lang="en-GB" dirty="0" err="1"/>
+              <a:t>Przetwarzanie</a:t>
+            </a:r>
+            <a:r>
+              <a:rPr lang="en-GB" dirty="0"/>
+              <a:t> </a:t>
+            </a:r>
+          </a:p>
+          <a:p>
+            <a:r>
+              <a:rPr lang="en-GB" dirty="0"/>
+              <a:t>HDInsight </a:t>
+            </a:r>
+            <a:r>
+              <a:rPr lang="en-GB" dirty="0" err="1"/>
+              <a:t>Spark,Hive</a:t>
+            </a:r>
+            <a:r>
+              <a:rPr lang="en-GB" dirty="0"/>
+              <a:t> Machine </a:t>
+            </a:r>
+            <a:r>
+              <a:rPr lang="en-GB" dirty="0" err="1"/>
+              <a:t>Learing</a:t>
+            </a:r>
+            <a:r>
+              <a:rPr lang="en-GB" dirty="0"/>
+              <a:t> </a:t>
+            </a:r>
+          </a:p>
+          <a:p>
+            <a:r>
+              <a:rPr lang="en-GB" dirty="0"/>
+              <a:t>Azure Data Lake Analytics</a:t>
+            </a:r>
+          </a:p>
+          <a:p>
+            <a:r>
+              <a:rPr lang="en-GB" dirty="0"/>
+              <a:t>Azure Databricks –</a:t>
+            </a:r>
+            <a:r>
+              <a:rPr lang="en-GB" dirty="0" err="1"/>
+              <a:t>ktore</a:t>
+            </a:r>
+            <a:r>
+              <a:rPr lang="en-GB" dirty="0"/>
+              <a:t> </a:t>
+            </a:r>
+            <a:r>
+              <a:rPr lang="en-GB" dirty="0" err="1"/>
+              <a:t>weszlo</a:t>
+            </a:r>
+            <a:r>
+              <a:rPr lang="en-GB" dirty="0"/>
+              <a:t> </a:t>
+            </a:r>
+            <a:r>
+              <a:rPr lang="en-GB" dirty="0" err="1"/>
+              <a:t>na</a:t>
+            </a:r>
+            <a:r>
+              <a:rPr lang="en-GB" dirty="0"/>
+              <a:t> </a:t>
+            </a:r>
+            <a:r>
+              <a:rPr lang="en-GB" dirty="0" err="1"/>
+              <a:t>poczatku</a:t>
+            </a:r>
+            <a:r>
+              <a:rPr lang="en-GB" dirty="0"/>
+              <a:t> 2018 I </a:t>
+            </a:r>
+            <a:r>
+              <a:rPr lang="en-GB" dirty="0" err="1"/>
+              <a:t>bardzo</a:t>
+            </a:r>
+            <a:r>
+              <a:rPr lang="en-GB" dirty="0"/>
+              <a:t> </a:t>
+            </a:r>
+            <a:r>
+              <a:rPr lang="en-GB" dirty="0" err="1"/>
+              <a:t>moca</a:t>
+            </a:r>
+            <a:r>
+              <a:rPr lang="en-GB" dirty="0"/>
+              <a:t> </a:t>
+            </a:r>
+            <a:r>
+              <a:rPr lang="en-GB" dirty="0" err="1"/>
+              <a:t>sie</a:t>
+            </a:r>
+            <a:r>
+              <a:rPr lang="en-GB" dirty="0"/>
+              <a:t> </a:t>
+            </a:r>
+            <a:r>
+              <a:rPr lang="en-GB" dirty="0" err="1"/>
+              <a:t>rozpycha</a:t>
+            </a:r>
+            <a:r>
+              <a:rPr lang="en-GB" dirty="0"/>
+              <a:t> (jest </a:t>
+            </a:r>
+            <a:r>
+              <a:rPr lang="en-GB" dirty="0" err="1"/>
+              <a:t>duzy</a:t>
+            </a:r>
+            <a:r>
+              <a:rPr lang="en-GB" dirty="0"/>
+              <a:t> boom </a:t>
+            </a:r>
+            <a:r>
+              <a:rPr lang="en-GB" dirty="0" err="1"/>
+              <a:t>na</a:t>
+            </a:r>
+            <a:r>
+              <a:rPr lang="en-GB" dirty="0"/>
+              <a:t> ta </a:t>
+            </a:r>
+            <a:r>
+              <a:rPr lang="en-GB" dirty="0" err="1"/>
+              <a:t>usluge</a:t>
+            </a:r>
+            <a:r>
+              <a:rPr lang="en-GB" dirty="0"/>
+              <a:t> np. ADF Data Flow)</a:t>
+            </a:r>
+          </a:p>
+        </p:txBody>
+      </p:sp>
+      <p:sp>
+        <p:nvSpPr>
+          <p:cNvPr id="4" name="Slide Number Placeholder 3"/>
+          <p:cNvSpPr>
+            <a:spLocks noGrp="1"/>
+          </p:cNvSpPr>
+          <p:nvPr>
+            <p:ph type="sldNum" sz="quarter" idx="5"/>
+          </p:nvPr>
+        </p:nvSpPr>
+        <p:spPr/>
+        <p:txBody>
+          <a:bodyPr/>
+          <a:lstStyle/>
+          <a:p>
+            <a:fld id="{55992286-4AA4-4E55-98B6-FFAF34B74A40}" type="slidenum">
+              <a:rPr lang="en-US" smtClean="0"/>
+              <a:t>7</a:t>
+            </a:fld>
+            <a:endParaRPr lang="en-US"/>
+          </a:p>
+        </p:txBody>
+      </p:sp>
+    </p:spTree>
+    <p:extLst>
+      <p:ext uri="{BB962C8B-B14F-4D97-AF65-F5344CB8AC3E}">
+        <p14:creationId xmlns:p14="http://schemas.microsoft.com/office/powerpoint/2010/main" val="290118700"/>
+      </p:ext>
+    </p:extLst>
+  </p:cSld>
+  <p:clrMapOvr>
+    <a:masterClrMapping/>
+  </p:clrMapOvr>
+</p:notes>
+</file>
+
+<file path=ppt/notesSlides/notesSlide8.xml><?xml version="1.0" encoding="utf-8"?>
+<p:notes xmlns:a="http://schemas.openxmlformats.org/drawingml/2006/main" xmlns:r="http://schemas.openxmlformats.org/officeDocument/2006/relationships" xmlns:p="http://schemas.openxmlformats.org/presentationml/2006/main">
+  <p:cSld>
+    <p:spTree>
+      <p:nvGrpSpPr>
+        <p:cNvPr id="1" name=""/>
+        <p:cNvGrpSpPr/>
+        <p:nvPr/>
+      </p:nvGrpSpPr>
+      <p:grpSpPr>
+        <a:xfrm>
+          <a:off x="0" y="0"/>
+          <a:ext cx="0" cy="0"/>
+          <a:chOff x="0" y="0"/>
+          <a:chExt cx="0" cy="0"/>
+        </a:xfrm>
+      </p:grpSpPr>
+      <p:sp>
+        <p:nvSpPr>
+          <p:cNvPr id="2" name="Slide Image Placeholder 1"/>
+          <p:cNvSpPr>
+            <a:spLocks noGrp="1" noRot="1" noChangeAspect="1"/>
+          </p:cNvSpPr>
+          <p:nvPr>
+            <p:ph type="sldImg"/>
+          </p:nvPr>
+        </p:nvSpPr>
+        <p:spPr/>
+      </p:sp>
+      <p:sp>
+        <p:nvSpPr>
+          <p:cNvPr id="3" name="Notes Placeholder 2"/>
+          <p:cNvSpPr>
+            <a:spLocks noGrp="1"/>
+          </p:cNvSpPr>
+          <p:nvPr>
+            <p:ph type="body" idx="1"/>
+          </p:nvPr>
+        </p:nvSpPr>
+        <p:spPr/>
+        <p:txBody>
+          <a:bodyPr/>
+          <a:lstStyle/>
+          <a:p>
+            <a:r>
+              <a:rPr lang="en-GB" dirty="0"/>
+              <a:t>Ale </a:t>
+            </a:r>
+            <a:r>
+              <a:rPr lang="en-GB" dirty="0" err="1"/>
+              <a:t>dzis</a:t>
+            </a:r>
+            <a:r>
+              <a:rPr lang="en-GB" dirty="0"/>
+              <a:t> </a:t>
+            </a:r>
+            <a:r>
+              <a:rPr lang="en-GB" dirty="0" err="1"/>
+              <a:t>nie</a:t>
+            </a:r>
+            <a:r>
+              <a:rPr lang="en-GB" dirty="0"/>
+              <a:t> o Azure Databricks </a:t>
+            </a:r>
+            <a:r>
+              <a:rPr lang="en-GB" dirty="0" err="1"/>
+              <a:t>tylko</a:t>
+            </a:r>
+            <a:r>
+              <a:rPr lang="en-GB" dirty="0"/>
+              <a:t> o Azure Data Lake </a:t>
+            </a:r>
+            <a:r>
+              <a:rPr lang="en-GB" dirty="0" err="1"/>
+              <a:t>Analytcis</a:t>
+            </a:r>
+            <a:r>
+              <a:rPr lang="en-GB" dirty="0"/>
+              <a:t> </a:t>
+            </a:r>
+          </a:p>
+          <a:p>
+            <a:r>
+              <a:rPr lang="en-GB" dirty="0"/>
+              <a:t>Model PaaS –sub model Query as a Service Job as Service</a:t>
+            </a:r>
+          </a:p>
+          <a:p>
+            <a:r>
+              <a:rPr lang="en-GB" dirty="0"/>
+              <a:t>To Federated Query troche </a:t>
+            </a:r>
+            <a:r>
+              <a:rPr lang="en-GB" dirty="0" err="1"/>
+              <a:t>na</a:t>
+            </a:r>
+            <a:r>
+              <a:rPr lang="en-GB" dirty="0"/>
+              <a:t> </a:t>
+            </a:r>
+            <a:r>
+              <a:rPr lang="en-GB" dirty="0" err="1"/>
+              <a:t>wyrost</a:t>
+            </a:r>
+            <a:r>
+              <a:rPr lang="en-GB" dirty="0"/>
+              <a:t> </a:t>
+            </a:r>
+            <a:r>
+              <a:rPr lang="en-GB" dirty="0" err="1"/>
+              <a:t>bo</a:t>
+            </a:r>
+            <a:r>
+              <a:rPr lang="en-GB" dirty="0"/>
+              <a:t> </a:t>
+            </a:r>
+            <a:r>
+              <a:rPr lang="en-GB" dirty="0" err="1"/>
+              <a:t>mamy</a:t>
+            </a:r>
+            <a:r>
+              <a:rPr lang="en-GB" dirty="0"/>
+              <a:t> </a:t>
+            </a:r>
+            <a:r>
+              <a:rPr lang="en-GB" dirty="0" err="1"/>
+              <a:t>tylko</a:t>
+            </a:r>
+            <a:r>
+              <a:rPr lang="en-GB" dirty="0"/>
+              <a:t> </a:t>
+            </a:r>
+            <a:r>
+              <a:rPr lang="en-GB" dirty="0" err="1"/>
+              <a:t>BLOBA,ADLS,Azure</a:t>
+            </a:r>
+            <a:r>
+              <a:rPr lang="en-GB" dirty="0"/>
+              <a:t> SQL </a:t>
+            </a:r>
+            <a:r>
+              <a:rPr lang="en-GB" dirty="0" err="1"/>
+              <a:t>oraz</a:t>
+            </a:r>
+            <a:r>
+              <a:rPr lang="en-GB" dirty="0"/>
+              <a:t> DW (</a:t>
+            </a:r>
+            <a:r>
+              <a:rPr lang="en-GB" dirty="0" err="1"/>
+              <a:t>tylko</a:t>
+            </a:r>
+            <a:r>
+              <a:rPr lang="en-GB" dirty="0"/>
+              <a:t> </a:t>
+            </a:r>
+            <a:r>
+              <a:rPr lang="en-GB" dirty="0" err="1"/>
+              <a:t>readonly</a:t>
+            </a:r>
+            <a:r>
+              <a:rPr lang="en-GB" dirty="0"/>
+              <a:t>)</a:t>
+            </a:r>
+            <a:endParaRPr lang="pl-PL" dirty="0"/>
+          </a:p>
+        </p:txBody>
+      </p:sp>
+      <p:sp>
+        <p:nvSpPr>
+          <p:cNvPr id="4" name="Slide Number Placeholder 3"/>
+          <p:cNvSpPr>
+            <a:spLocks noGrp="1"/>
+          </p:cNvSpPr>
+          <p:nvPr>
+            <p:ph type="sldNum" sz="quarter" idx="5"/>
+          </p:nvPr>
+        </p:nvSpPr>
+        <p:spPr/>
+        <p:txBody>
+          <a:bodyPr/>
+          <a:lstStyle/>
+          <a:p>
+            <a:fld id="{55992286-4AA4-4E55-98B6-FFAF34B74A40}" type="slidenum">
+              <a:rPr lang="en-US" smtClean="0"/>
+              <a:t>8</a:t>
+            </a:fld>
+            <a:endParaRPr lang="en-US"/>
+          </a:p>
+        </p:txBody>
+      </p:sp>
+    </p:spTree>
+    <p:extLst>
+      <p:ext uri="{BB962C8B-B14F-4D97-AF65-F5344CB8AC3E}">
+        <p14:creationId xmlns:p14="http://schemas.microsoft.com/office/powerpoint/2010/main" val="348825430"/>
+      </p:ext>
+    </p:extLst>
+  </p:cSld>
+  <p:clrMapOvr>
+    <a:masterClrMapping/>
+  </p:clrMapOvr>
+</p:notes>
+</file>
+
+<file path=ppt/notesSlides/notesSlide9.xml><?xml version="1.0" encoding="utf-8"?>
+<p:notes xmlns:a="http://schemas.openxmlformats.org/drawingml/2006/main" xmlns:r="http://schemas.openxmlformats.org/officeDocument/2006/relationships" xmlns:p="http://schemas.openxmlformats.org/presentationml/2006/main">
+  <p:cSld>
+    <p:spTree>
+      <p:nvGrpSpPr>
+        <p:cNvPr id="1" name=""/>
+        <p:cNvGrpSpPr/>
+        <p:nvPr/>
+      </p:nvGrpSpPr>
+      <p:grpSpPr>
+        <a:xfrm>
+          <a:off x="0" y="0"/>
+          <a:ext cx="0" cy="0"/>
+          <a:chOff x="0" y="0"/>
+          <a:chExt cx="0" cy="0"/>
+        </a:xfrm>
+      </p:grpSpPr>
+      <p:sp>
+        <p:nvSpPr>
+          <p:cNvPr id="2" name="Slide Image Placeholder 1"/>
+          <p:cNvSpPr>
+            <a:spLocks noGrp="1" noRot="1" noChangeAspect="1"/>
+          </p:cNvSpPr>
+          <p:nvPr>
+            <p:ph type="sldImg"/>
+          </p:nvPr>
+        </p:nvSpPr>
+        <p:spPr/>
+      </p:sp>
+      <p:sp>
+        <p:nvSpPr>
+          <p:cNvPr id="3" name="Notes Placeholder 2"/>
+          <p:cNvSpPr>
+            <a:spLocks noGrp="1"/>
+          </p:cNvSpPr>
+          <p:nvPr>
+            <p:ph type="body" idx="1"/>
+          </p:nvPr>
+        </p:nvSpPr>
+        <p:spPr/>
+        <p:txBody>
+          <a:bodyPr/>
+          <a:lstStyle/>
+          <a:p>
+            <a:endParaRPr lang="pl-PL" dirty="0"/>
+          </a:p>
+        </p:txBody>
+      </p:sp>
+      <p:sp>
+        <p:nvSpPr>
+          <p:cNvPr id="4" name="Slide Number Placeholder 3"/>
+          <p:cNvSpPr>
+            <a:spLocks noGrp="1"/>
+          </p:cNvSpPr>
+          <p:nvPr>
+            <p:ph type="sldNum" sz="quarter" idx="5"/>
+          </p:nvPr>
+        </p:nvSpPr>
+        <p:spPr/>
+        <p:txBody>
+          <a:bodyPr/>
+          <a:lstStyle/>
+          <a:p>
+            <a:fld id="{55992286-4AA4-4E55-98B6-FFAF34B74A40}" type="slidenum">
+              <a:rPr lang="en-US" smtClean="0"/>
+              <a:t>9</a:t>
+            </a:fld>
+            <a:endParaRPr lang="en-US"/>
+          </a:p>
+        </p:txBody>
+      </p:sp>
+    </p:spTree>
+    <p:extLst>
+      <p:ext uri="{BB962C8B-B14F-4D97-AF65-F5344CB8AC3E}">
+        <p14:creationId xmlns:p14="http://schemas.microsoft.com/office/powerpoint/2010/main" val="4131579920"/>
+      </p:ext>
+    </p:extLst>
+  </p:cSld>
+  <p:clrMapOvr>
+    <a:masterClrMapping/>
+  </p:clrMapOvr>
+</p:notes>
 </file>
 
 <file path=ppt/slideLayouts/slideLayout1.xml><?xml version="1.0" encoding="utf-8"?>
@@ -2716,7 +6830,7 @@
           <p:nvPr/>
         </p:nvPicPr>
         <p:blipFill>
-          <a:blip r:embed="rId2">
+          <a:blip r:embed="rId3">
             <a:extLst>
               <a:ext uri="{28A0092B-C50C-407E-A947-70E740481C1C}">
                 <a14:useLocalDpi xmlns:a14="http://schemas.microsoft.com/office/drawing/2010/main" val="0"/>
@@ -13655,9 +17769,7 @@
             <a:r>
               <a:rPr lang="pl-PL" dirty="0">
                 <a:solidFill>
-                  <a:srgbClr val="E8A565">
-                    <a:lumMod val="75000"/>
-                  </a:srgbClr>
+                  <a:srgbClr val="EF942F"/>
                 </a:solidFill>
                 <a:latin typeface="Euphemia"/>
               </a:rPr>
@@ -13705,9 +17817,7 @@
             <a:r>
               <a:rPr lang="pl-PL" b="1" dirty="0">
                 <a:solidFill>
-                  <a:srgbClr val="E8A565">
-                    <a:lumMod val="75000"/>
-                  </a:srgbClr>
+                  <a:srgbClr val="EF942F"/>
                 </a:solidFill>
                 <a:latin typeface="Euphemia"/>
               </a:rPr>
@@ -13716,9 +17826,7 @@
             <a:r>
               <a:rPr lang="en-GB" b="1" dirty="0">
                 <a:solidFill>
-                  <a:srgbClr val="E8A565">
-                    <a:lumMod val="75000"/>
-                  </a:srgbClr>
+                  <a:srgbClr val="EF942F"/>
                 </a:solidFill>
                 <a:latin typeface="Euphemia"/>
               </a:rPr>
@@ -13786,24 +17894,31 @@
             <a:r>
               <a:rPr lang="pl-PL" b="1" dirty="0">
                 <a:solidFill>
+                  <a:srgbClr val="EF942F"/>
+                </a:solidFill>
+                <a:latin typeface="Euphemia"/>
+              </a:rPr>
+              <a:t>Reducers</a:t>
+            </a:r>
+            <a:r>
+              <a:rPr lang="en-GB" b="1" dirty="0">
+                <a:solidFill>
+                  <a:srgbClr val="EF942F"/>
+                </a:solidFill>
+                <a:latin typeface="Euphemia"/>
+              </a:rPr>
+              <a:t> USQL: REDUCE </a:t>
+            </a:r>
+            <a:r>
+              <a:rPr lang="en-GB" b="1" dirty="0">
+                <a:solidFill>
                   <a:srgbClr val="E8A565">
                     <a:lumMod val="75000"/>
                   </a:srgbClr>
                 </a:solidFill>
                 <a:latin typeface="Euphemia"/>
               </a:rPr>
-              <a:t>Reducers</a:t>
-            </a:r>
-            <a:r>
-              <a:rPr lang="en-GB" b="1" dirty="0">
-                <a:solidFill>
-                  <a:srgbClr val="E8A565">
-                    <a:lumMod val="75000"/>
-                  </a:srgbClr>
-                </a:solidFill>
-                <a:latin typeface="Euphemia"/>
-              </a:rPr>
-              <a:t> USQL: REDUCE 	</a:t>
+              <a:t>	</a:t>
             </a:r>
             <a:endParaRPr lang="en-GB" b="1" dirty="0">
               <a:solidFill>
@@ -13822,42 +17937,15 @@
               <a:defRPr/>
             </a:pPr>
             <a:r>
-              <a:rPr lang="en-GB" sz="1800" b="1" dirty="0">
-                <a:solidFill>
-                  <a:schemeClr val="tx1">
-                    <a:lumMod val="65000"/>
-                    <a:lumOff val="35000"/>
-                  </a:schemeClr>
+              <a:rPr lang="en-US" sz="1800" b="1" dirty="0">
+                <a:solidFill>
+                  <a:srgbClr val="465562"/>
                 </a:solidFill>
                 <a:latin typeface="Euphemia"/>
               </a:rPr>
-              <a:t>Converts </a:t>
-            </a:r>
-            <a:r>
-              <a:rPr lang="en-GB" sz="1800" b="1" dirty="0" err="1">
-                <a:solidFill>
-                  <a:schemeClr val="tx1">
-                    <a:lumMod val="65000"/>
-                    <a:lumOff val="35000"/>
-                  </a:schemeClr>
-                </a:solidFill>
-                <a:latin typeface="Euphemia"/>
-              </a:rPr>
-              <a:t>rowset</a:t>
-            </a:r>
-            <a:r>
-              <a:rPr lang="en-GB" sz="1800" b="1" dirty="0">
-                <a:solidFill>
-                  <a:schemeClr val="tx1">
-                    <a:lumMod val="65000"/>
-                    <a:lumOff val="35000"/>
-                  </a:schemeClr>
-                </a:solidFill>
-                <a:latin typeface="Euphemia"/>
-              </a:rPr>
-              <a:t> into files </a:t>
-            </a:r>
-            <a:endParaRPr lang="pl-PL" sz="1800" b="1" dirty="0">
+              <a:t>Take n rows and produce m rows (normally m&lt;n)</a:t>
+            </a:r>
+            <a:endParaRPr lang="en-GB" sz="1800" b="1" dirty="0">
               <a:solidFill>
                 <a:schemeClr val="tx1">
                   <a:lumMod val="65000"/>
@@ -13876,9 +17964,7 @@
             <a:r>
               <a:rPr lang="pl-PL" b="1" dirty="0">
                 <a:solidFill>
-                  <a:srgbClr val="E8A565">
-                    <a:lumMod val="75000"/>
-                  </a:srgbClr>
+                  <a:srgbClr val="EF942F"/>
                 </a:solidFill>
                 <a:latin typeface="Euphemia"/>
               </a:rPr>
@@ -13887,9 +17973,7 @@
             <a:r>
               <a:rPr lang="en-GB" b="1" dirty="0">
                 <a:solidFill>
-                  <a:srgbClr val="E8A565">
-                    <a:lumMod val="75000"/>
-                  </a:srgbClr>
+                  <a:srgbClr val="EF942F"/>
                 </a:solidFill>
                 <a:latin typeface="Euphemia"/>
               </a:rPr>
@@ -14213,9 +18297,7 @@
             <a:r>
               <a:rPr lang="en-GB" b="1" dirty="0">
                 <a:solidFill>
-                  <a:srgbClr val="E8A565">
-                    <a:lumMod val="75000"/>
-                  </a:srgbClr>
+                  <a:srgbClr val="EF942F"/>
                 </a:solidFill>
                 <a:latin typeface="Euphemia"/>
               </a:rPr>
@@ -14223,7 +18305,7 @@
             </a:r>
             <a:endParaRPr lang="en-GB" dirty="0">
               <a:solidFill>
-                <a:srgbClr val="465562"/>
+                <a:srgbClr val="EF942F"/>
               </a:solidFill>
               <a:latin typeface="Euphemia"/>
             </a:endParaRPr>
@@ -14284,9 +18366,7 @@
             <a:r>
               <a:rPr lang="en-GB" b="1" dirty="0">
                 <a:solidFill>
-                  <a:srgbClr val="E8A565">
-                    <a:lumMod val="75000"/>
-                  </a:srgbClr>
+                  <a:srgbClr val="EF942F"/>
                 </a:solidFill>
                 <a:latin typeface="Euphemia"/>
               </a:rPr>
@@ -14294,7 +18374,7 @@
             </a:r>
             <a:endParaRPr lang="en-US" dirty="0">
               <a:solidFill>
-                <a:srgbClr val="465562"/>
+                <a:srgbClr val="EF942F"/>
               </a:solidFill>
               <a:latin typeface="Euphemia"/>
             </a:endParaRPr>
@@ -14346,55 +18426,90 @@
               <a:defRPr/>
             </a:pPr>
             <a:r>
-              <a:rPr lang="pl-PL" dirty="0">
-                <a:solidFill>
-                  <a:srgbClr val="465562"/>
+              <a:rPr lang="pl-PL" b="1" dirty="0">
+                <a:solidFill>
+                  <a:srgbClr val="EF942F"/>
                 </a:solidFill>
                 <a:latin typeface="Euphemia"/>
               </a:rPr>
               <a:t>Output</a:t>
             </a:r>
             <a:r>
-              <a:rPr lang="en-GB" dirty="0">
-                <a:solidFill>
-                  <a:srgbClr val="465562"/>
+              <a:rPr lang="en-GB" b="1" dirty="0">
+                <a:solidFill>
+                  <a:srgbClr val="EF942F"/>
                 </a:solidFill>
                 <a:latin typeface="Euphemia"/>
               </a:rPr>
               <a:t>t</a:t>
             </a:r>
             <a:r>
-              <a:rPr lang="pl-PL" dirty="0">
-                <a:solidFill>
-                  <a:srgbClr val="465562"/>
+              <a:rPr lang="pl-PL" b="1" dirty="0">
+                <a:solidFill>
+                  <a:srgbClr val="EF942F"/>
                 </a:solidFill>
                 <a:latin typeface="Euphemia"/>
               </a:rPr>
               <a:t>ers</a:t>
             </a:r>
             <a:r>
-              <a:rPr lang="en-GB" dirty="0">
-                <a:solidFill>
-                  <a:srgbClr val="465562"/>
+              <a:rPr lang="en-GB" b="1" dirty="0">
+                <a:solidFill>
+                  <a:srgbClr val="EF942F"/>
                 </a:solidFill>
                 <a:latin typeface="Euphemia"/>
               </a:rPr>
-              <a:t> </a:t>
-            </a:r>
+              <a:t> USQL: OUTPUT</a:t>
+            </a:r>
+          </a:p>
+          <a:p>
+            <a:pPr lvl="2">
+              <a:buFont typeface="Arial" panose="020B0604020202020204" pitchFamily="34" charset="0"/>
+              <a:buChar char="•"/>
+              <a:defRPr/>
+            </a:pPr>
             <a:r>
               <a:rPr lang="en-GB" b="1" dirty="0">
                 <a:solidFill>
-                  <a:srgbClr val="E8A565">
-                    <a:lumMod val="75000"/>
-                  </a:srgbClr>
+                  <a:schemeClr val="tx1">
+                    <a:lumMod val="65000"/>
+                    <a:lumOff val="35000"/>
+                  </a:schemeClr>
                 </a:solidFill>
                 <a:latin typeface="Euphemia"/>
               </a:rPr>
-              <a:t>USQL: OUTPUT</a:t>
-            </a:r>
-            <a:endParaRPr lang="en-GB" dirty="0">
+              <a:t>Converts </a:t>
+            </a:r>
+            <a:r>
+              <a:rPr lang="en-GB" b="1" dirty="0" err="1">
+                <a:solidFill>
+                  <a:schemeClr val="tx1">
+                    <a:lumMod val="65000"/>
+                    <a:lumOff val="35000"/>
+                  </a:schemeClr>
+                </a:solidFill>
+                <a:latin typeface="Euphemia"/>
+              </a:rPr>
+              <a:t>rowset</a:t>
+            </a:r>
+            <a:r>
+              <a:rPr lang="en-GB" b="1" dirty="0">
+                <a:solidFill>
+                  <a:schemeClr val="tx1">
+                    <a:lumMod val="65000"/>
+                    <a:lumOff val="35000"/>
+                  </a:schemeClr>
+                </a:solidFill>
+                <a:latin typeface="Euphemia"/>
+              </a:rPr>
+              <a:t> into file</a:t>
+            </a:r>
+            <a:endParaRPr lang="pl-PL" b="1" dirty="0">
               <a:solidFill>
-                <a:srgbClr val="465562"/>
+                <a:schemeClr val="tx1">
+                  <a:lumMod val="65000"/>
+                  <a:lumOff val="35000"/>
+                </a:schemeClr>
               </a:solidFill>
               <a:latin typeface="Euphemia"/>
             </a:endParaRPr>
@@ -14405,15 +18520,12 @@
               <a:buChar char="•"/>
               <a:defRPr/>
             </a:pPr>
-            <a:r>
-              <a:rPr lang="en-US" b="1" dirty="0">
-                <a:solidFill>
-                  <a:srgbClr val="465562"/>
-                </a:solidFill>
-                <a:latin typeface="Euphemia"/>
-              </a:rPr>
-              <a:t>Take n rows and produce m rows (normally m&lt;n)</a:t>
-            </a:r>
+            <a:endParaRPr lang="en-GB" dirty="0">
+              <a:solidFill>
+                <a:srgbClr val="465562"/>
+              </a:solidFill>
+              <a:latin typeface="Euphemia"/>
+            </a:endParaRPr>
           </a:p>
           <a:p>
             <a:pPr lvl="2">
@@ -15094,7 +19206,7 @@
           <p:nvPr/>
         </p:nvPicPr>
         <p:blipFill>
-          <a:blip r:embed="rId2"/>
+          <a:blip r:embed="rId3"/>
           <a:stretch>
             <a:fillRect/>
           </a:stretch>
@@ -23943,7 +28055,7 @@
           <p:nvPr/>
         </p:nvPicPr>
         <p:blipFill>
-          <a:blip r:embed="rId2" cstate="print">
+          <a:blip r:embed="rId3" cstate="print">
             <a:extLst>
               <a:ext uri="{28A0092B-C50C-407E-A947-70E740481C1C}">
                 <a14:useLocalDpi xmlns:a14="http://schemas.microsoft.com/office/drawing/2010/main" val="0"/>
@@ -30282,18 +34394,22 @@
                 </a:solidFill>
                 <a:hlinkClick r:id="rId3"/>
               </a:rPr>
-              <a:t>https://github.com/cloud4yourdata/demos/tree/master/4DevKrakow2018</a:t>
-            </a:r>
-            <a:r>
-              <a:rPr lang="pl-PL" kern="0" dirty="0">
-                <a:solidFill>
-                  <a:prstClr val="black"/>
-                </a:solidFill>
-              </a:rPr>
-              <a:t> </a:t>
-            </a:r>
-            <a:r>
-              <a:rPr lang="pl-PL" kern="0" dirty="0">
+              <a:t>https://github.com/cloud4yourdata/demos/tree/master/4DevKatowice2018/USQL</a:t>
+            </a:r>
+            <a:endParaRPr lang="en-GB" kern="0">
+              <a:solidFill>
+                <a:prstClr val="black"/>
+              </a:solidFill>
+            </a:endParaRPr>
+          </a:p>
+          <a:p>
+            <a:pPr marL="342900" indent="-342900">
+              <a:buFont typeface="Arial" panose="020B0604020202020204" pitchFamily="34" charset="0"/>
+              <a:buChar char="•"/>
+              <a:defRPr/>
+            </a:pPr>
+            <a:r>
+              <a:rPr lang="pl-PL" kern="0">
                 <a:solidFill>
                   <a:prstClr val="black"/>
                 </a:solidFill>
@@ -30305,7 +34421,22 @@
                   </a:extLst>
                 </a:hlinkClick>
               </a:rPr>
-              <a:t>https://github.com/cloud4yourdata/usql/</a:t>
+              <a:t>https</a:t>
+            </a:r>
+            <a:r>
+              <a:rPr lang="pl-PL" kern="0" dirty="0">
+                <a:solidFill>
+                  <a:prstClr val="black"/>
+                </a:solidFill>
+                <a:hlinkClick r:id="rId4">
+                  <a:extLst>
+                    <a:ext uri="{A12FA001-AC4F-418D-AE19-62706E023703}">
+                      <ahyp:hlinkClr xmlns:ahyp="http://schemas.microsoft.com/office/drawing/2018/hyperlinkcolor" val="tx"/>
+                    </a:ext>
+                  </a:extLst>
+                </a:hlinkClick>
+              </a:rPr>
+              <a:t>://github.com/cloud4yourdata/usql/</a:t>
             </a:r>
             <a:endParaRPr lang="pl-PL" kern="0" dirty="0">
               <a:solidFill>
@@ -31138,7 +35269,7 @@
                   </a:schemeClr>
                 </a:solidFill>
               </a:rPr>
-              <a:t>Azure Data Lake – quick overview</a:t>
+              <a:t> Azure Data Lake – quick overview</a:t>
             </a:r>
           </a:p>
           <a:p>
@@ -31155,7 +35286,26 @@
                   </a:schemeClr>
                 </a:solidFill>
               </a:rPr>
-              <a:t>U-SQL – quick overview</a:t>
+              <a:t> </a:t>
+            </a:r>
+            <a:r>
+              <a:rPr lang="en-GB" sz="4000" b="1" dirty="0">
+                <a:solidFill>
+                  <a:srgbClr val="EF942F"/>
+                </a:solidFill>
+              </a:rPr>
+              <a:t>U-SQL</a:t>
+            </a:r>
+            <a:r>
+              <a:rPr lang="en-GB" sz="4000" b="1" dirty="0">
+                <a:solidFill>
+                  <a:schemeClr val="tx1">
+                    <a:lumMod val="65000"/>
+                    <a:lumOff val="35000"/>
+                  </a:schemeClr>
+                </a:solidFill>
+              </a:rPr>
+              <a:t> – quick overview</a:t>
             </a:r>
           </a:p>
           <a:p>
@@ -31172,7 +35322,7 @@
                   </a:schemeClr>
                 </a:solidFill>
               </a:rPr>
-              <a:t>U-SQL Extensions </a:t>
+              <a:t> U-SQL Extensions </a:t>
             </a:r>
           </a:p>
           <a:p>
@@ -31208,7 +35358,7 @@
                   </a:schemeClr>
                 </a:solidFill>
               </a:rPr>
-              <a:t>Q&amp;A</a:t>
+              <a:t> Q&amp;A</a:t>
             </a:r>
           </a:p>
           <a:p>
@@ -35401,7 +39551,7 @@
           <p:nvPr/>
         </p:nvPicPr>
         <p:blipFill>
-          <a:blip r:embed="rId2"/>
+          <a:blip r:embed="rId3"/>
           <a:stretch>
             <a:fillRect/>
           </a:stretch>
@@ -35431,7 +39581,7 @@
           <p:nvPr/>
         </p:nvPicPr>
         <p:blipFill>
-          <a:blip r:embed="rId3"/>
+          <a:blip r:embed="rId4"/>
           <a:stretch>
             <a:fillRect/>
           </a:stretch>
@@ -35461,7 +39611,7 @@
           <p:nvPr/>
         </p:nvPicPr>
         <p:blipFill>
-          <a:blip r:embed="rId4"/>
+          <a:blip r:embed="rId5"/>
           <a:stretch>
             <a:fillRect/>
           </a:stretch>
@@ -35511,7 +39661,7 @@
             <p:nvPr/>
           </p:nvPicPr>
           <p:blipFill>
-            <a:blip r:embed="rId5"/>
+            <a:blip r:embed="rId6"/>
             <a:stretch>
               <a:fillRect/>
             </a:stretch>
@@ -36230,7 +40380,10 @@
             <a:r>
               <a:rPr lang="en-US" sz="2600" b="1" dirty="0">
                 <a:solidFill>
-                  <a:srgbClr val="EF942F"/>
+                  <a:schemeClr val="tx1">
+                    <a:lumMod val="65000"/>
+                    <a:lumOff val="35000"/>
+                  </a:schemeClr>
                 </a:solidFill>
                 <a:latin typeface="Euphemia"/>
               </a:rPr>
@@ -36639,7 +40792,7 @@
           <p:nvPr/>
         </p:nvPicPr>
         <p:blipFill>
-          <a:blip r:embed="rId2"/>
+          <a:blip r:embed="rId3"/>
           <a:stretch>
             <a:fillRect/>
           </a:stretch>

</xml_diff>